<commit_message>
Update 01.07.2024 SCO is working
</commit_message>
<xml_diff>
--- a/main/ExampleBattery.pptx
+++ b/main/ExampleBattery.pptx
@@ -8,6 +8,8 @@
     <p:sldId id="256" r:id="rId2"/>
     <p:sldId id="257" r:id="rId3"/>
     <p:sldId id="258" r:id="rId4"/>
+    <p:sldId id="260" r:id="rId5"/>
+    <p:sldId id="259" r:id="rId6"/>
   </p:sldIdLst>
   <p:sldSz cx="12192000" cy="6858000"/>
   <p:notesSz cx="6858000" cy="9144000"/>
@@ -261,7 +263,7 @@
           <a:p>
             <a:fld id="{217BF3B2-92C1-4518-AED7-C6BBE55D17D1}" type="datetimeFigureOut">
               <a:rPr lang="de-DE" smtClean="0"/>
-              <a:t>11.03.2024</a:t>
+              <a:t>18.04.2024</a:t>
             </a:fld>
             <a:endParaRPr lang="de-DE"/>
           </a:p>
@@ -459,7 +461,7 @@
           <a:p>
             <a:fld id="{217BF3B2-92C1-4518-AED7-C6BBE55D17D1}" type="datetimeFigureOut">
               <a:rPr lang="de-DE" smtClean="0"/>
-              <a:t>11.03.2024</a:t>
+              <a:t>18.04.2024</a:t>
             </a:fld>
             <a:endParaRPr lang="de-DE"/>
           </a:p>
@@ -667,7 +669,7 @@
           <a:p>
             <a:fld id="{217BF3B2-92C1-4518-AED7-C6BBE55D17D1}" type="datetimeFigureOut">
               <a:rPr lang="de-DE" smtClean="0"/>
-              <a:t>11.03.2024</a:t>
+              <a:t>18.04.2024</a:t>
             </a:fld>
             <a:endParaRPr lang="de-DE"/>
           </a:p>
@@ -865,7 +867,7 @@
           <a:p>
             <a:fld id="{217BF3B2-92C1-4518-AED7-C6BBE55D17D1}" type="datetimeFigureOut">
               <a:rPr lang="de-DE" smtClean="0"/>
-              <a:t>11.03.2024</a:t>
+              <a:t>18.04.2024</a:t>
             </a:fld>
             <a:endParaRPr lang="de-DE"/>
           </a:p>
@@ -1140,7 +1142,7 @@
           <a:p>
             <a:fld id="{217BF3B2-92C1-4518-AED7-C6BBE55D17D1}" type="datetimeFigureOut">
               <a:rPr lang="de-DE" smtClean="0"/>
-              <a:t>11.03.2024</a:t>
+              <a:t>18.04.2024</a:t>
             </a:fld>
             <a:endParaRPr lang="de-DE"/>
           </a:p>
@@ -1405,7 +1407,7 @@
           <a:p>
             <a:fld id="{217BF3B2-92C1-4518-AED7-C6BBE55D17D1}" type="datetimeFigureOut">
               <a:rPr lang="de-DE" smtClean="0"/>
-              <a:t>11.03.2024</a:t>
+              <a:t>18.04.2024</a:t>
             </a:fld>
             <a:endParaRPr lang="de-DE"/>
           </a:p>
@@ -1817,7 +1819,7 @@
           <a:p>
             <a:fld id="{217BF3B2-92C1-4518-AED7-C6BBE55D17D1}" type="datetimeFigureOut">
               <a:rPr lang="de-DE" smtClean="0"/>
-              <a:t>11.03.2024</a:t>
+              <a:t>18.04.2024</a:t>
             </a:fld>
             <a:endParaRPr lang="de-DE"/>
           </a:p>
@@ -1958,7 +1960,7 @@
           <a:p>
             <a:fld id="{217BF3B2-92C1-4518-AED7-C6BBE55D17D1}" type="datetimeFigureOut">
               <a:rPr lang="de-DE" smtClean="0"/>
-              <a:t>11.03.2024</a:t>
+              <a:t>18.04.2024</a:t>
             </a:fld>
             <a:endParaRPr lang="de-DE"/>
           </a:p>
@@ -2071,7 +2073,7 @@
           <a:p>
             <a:fld id="{217BF3B2-92C1-4518-AED7-C6BBE55D17D1}" type="datetimeFigureOut">
               <a:rPr lang="de-DE" smtClean="0"/>
-              <a:t>11.03.2024</a:t>
+              <a:t>18.04.2024</a:t>
             </a:fld>
             <a:endParaRPr lang="de-DE"/>
           </a:p>
@@ -2382,7 +2384,7 @@
           <a:p>
             <a:fld id="{217BF3B2-92C1-4518-AED7-C6BBE55D17D1}" type="datetimeFigureOut">
               <a:rPr lang="de-DE" smtClean="0"/>
-              <a:t>11.03.2024</a:t>
+              <a:t>18.04.2024</a:t>
             </a:fld>
             <a:endParaRPr lang="de-DE"/>
           </a:p>
@@ -2670,7 +2672,7 @@
           <a:p>
             <a:fld id="{217BF3B2-92C1-4518-AED7-C6BBE55D17D1}" type="datetimeFigureOut">
               <a:rPr lang="de-DE" smtClean="0"/>
-              <a:t>11.03.2024</a:t>
+              <a:t>18.04.2024</a:t>
             </a:fld>
             <a:endParaRPr lang="de-DE"/>
           </a:p>
@@ -2911,7 +2913,7 @@
           <a:p>
             <a:fld id="{217BF3B2-92C1-4518-AED7-C6BBE55D17D1}" type="datetimeFigureOut">
               <a:rPr lang="de-DE" smtClean="0"/>
-              <a:t>11.03.2024</a:t>
+              <a:t>18.04.2024</a:t>
             </a:fld>
             <a:endParaRPr lang="de-DE"/>
           </a:p>
@@ -4677,6 +4679,1277 @@
     <p:extLst>
       <p:ext uri="{BB962C8B-B14F-4D97-AF65-F5344CB8AC3E}">
         <p14:creationId xmlns:p14="http://schemas.microsoft.com/office/powerpoint/2010/main" val="2326149561"/>
+      </p:ext>
+    </p:extLst>
+  </p:cSld>
+  <p:clrMapOvr>
+    <a:masterClrMapping/>
+  </p:clrMapOvr>
+</p:sld>
+</file>
+
+<file path=ppt/slides/slide4.xml><?xml version="1.0" encoding="utf-8"?>
+<p:sld xmlns:a="http://schemas.openxmlformats.org/drawingml/2006/main" xmlns:r="http://schemas.openxmlformats.org/officeDocument/2006/relationships" xmlns:p="http://schemas.openxmlformats.org/presentationml/2006/main">
+  <p:cSld>
+    <p:spTree>
+      <p:nvGrpSpPr>
+        <p:cNvPr id="1" name=""/>
+        <p:cNvGrpSpPr/>
+        <p:nvPr/>
+      </p:nvGrpSpPr>
+      <p:grpSpPr>
+        <a:xfrm>
+          <a:off x="0" y="0"/>
+          <a:ext cx="0" cy="0"/>
+          <a:chOff x="0" y="0"/>
+          <a:chExt cx="0" cy="0"/>
+        </a:xfrm>
+      </p:grpSpPr>
+      <p:sp>
+        <p:nvSpPr>
+          <p:cNvPr id="2" name="Titel 1">
+            <a:extLst>
+              <a:ext uri="{FF2B5EF4-FFF2-40B4-BE49-F238E27FC236}">
+                <a16:creationId xmlns:a16="http://schemas.microsoft.com/office/drawing/2014/main" id="{91166D35-B3F3-12BC-220F-279799A4A15E}"/>
+              </a:ext>
+            </a:extLst>
+          </p:cNvPr>
+          <p:cNvSpPr>
+            <a:spLocks noGrp="1"/>
+          </p:cNvSpPr>
+          <p:nvPr>
+            <p:ph type="title"/>
+          </p:nvPr>
+        </p:nvSpPr>
+        <p:spPr/>
+        <p:txBody>
+          <a:bodyPr/>
+          <a:lstStyle/>
+          <a:p>
+            <a:endParaRPr lang="de-DE"/>
+          </a:p>
+        </p:txBody>
+      </p:sp>
+      <p:sp>
+        <p:nvSpPr>
+          <p:cNvPr id="4" name="Rechteck 3">
+            <a:extLst>
+              <a:ext uri="{FF2B5EF4-FFF2-40B4-BE49-F238E27FC236}">
+                <a16:creationId xmlns:a16="http://schemas.microsoft.com/office/drawing/2014/main" id="{E23ACDB0-C638-FDC5-5424-0677F74791EE}"/>
+              </a:ext>
+            </a:extLst>
+          </p:cNvPr>
+          <p:cNvSpPr/>
+          <p:nvPr/>
+        </p:nvSpPr>
+        <p:spPr>
+          <a:xfrm>
+            <a:off x="2771192" y="3209731"/>
+            <a:ext cx="1828800" cy="1278293"/>
+          </a:xfrm>
+          <a:prstGeom prst="rect">
+            <a:avLst/>
+          </a:prstGeom>
+          <a:noFill/>
+        </p:spPr>
+        <p:style>
+          <a:lnRef idx="2">
+            <a:schemeClr val="accent1">
+              <a:shade val="15000"/>
+            </a:schemeClr>
+          </a:lnRef>
+          <a:fillRef idx="1">
+            <a:schemeClr val="accent1"/>
+          </a:fillRef>
+          <a:effectRef idx="0">
+            <a:schemeClr val="accent1"/>
+          </a:effectRef>
+          <a:fontRef idx="minor">
+            <a:schemeClr val="lt1"/>
+          </a:fontRef>
+        </p:style>
+        <p:txBody>
+          <a:bodyPr rtlCol="0" anchor="ctr"/>
+          <a:lstStyle/>
+          <a:p>
+            <a:pPr algn="ctr"/>
+            <a:endParaRPr lang="de-DE"/>
+          </a:p>
+        </p:txBody>
+      </p:sp>
+      <p:sp>
+        <p:nvSpPr>
+          <p:cNvPr id="5" name="Rechteck 4">
+            <a:extLst>
+              <a:ext uri="{FF2B5EF4-FFF2-40B4-BE49-F238E27FC236}">
+                <a16:creationId xmlns:a16="http://schemas.microsoft.com/office/drawing/2014/main" id="{B2EC4EF0-730F-E2BF-04AB-53F7D6EA377D}"/>
+              </a:ext>
+            </a:extLst>
+          </p:cNvPr>
+          <p:cNvSpPr/>
+          <p:nvPr/>
+        </p:nvSpPr>
+        <p:spPr>
+          <a:xfrm>
+            <a:off x="7063760" y="3161921"/>
+            <a:ext cx="1828800" cy="1278293"/>
+          </a:xfrm>
+          <a:prstGeom prst="rect">
+            <a:avLst/>
+          </a:prstGeom>
+          <a:solidFill>
+            <a:schemeClr val="bg1"/>
+          </a:solidFill>
+        </p:spPr>
+        <p:style>
+          <a:lnRef idx="2">
+            <a:schemeClr val="accent1">
+              <a:shade val="15000"/>
+            </a:schemeClr>
+          </a:lnRef>
+          <a:fillRef idx="1">
+            <a:schemeClr val="accent1"/>
+          </a:fillRef>
+          <a:effectRef idx="0">
+            <a:schemeClr val="accent1"/>
+          </a:effectRef>
+          <a:fontRef idx="minor">
+            <a:schemeClr val="lt1"/>
+          </a:fontRef>
+        </p:style>
+        <p:txBody>
+          <a:bodyPr rtlCol="0" anchor="ctr"/>
+          <a:lstStyle/>
+          <a:p>
+            <a:pPr algn="ctr"/>
+            <a:endParaRPr lang="de-DE"/>
+          </a:p>
+        </p:txBody>
+      </p:sp>
+      <p:sp>
+        <p:nvSpPr>
+          <p:cNvPr id="6" name="Rechteck 5">
+            <a:extLst>
+              <a:ext uri="{FF2B5EF4-FFF2-40B4-BE49-F238E27FC236}">
+                <a16:creationId xmlns:a16="http://schemas.microsoft.com/office/drawing/2014/main" id="{BB9CDDEE-5EF3-EB10-B8F1-060017A86251}"/>
+              </a:ext>
+            </a:extLst>
+          </p:cNvPr>
+          <p:cNvSpPr/>
+          <p:nvPr/>
+        </p:nvSpPr>
+        <p:spPr>
+          <a:xfrm>
+            <a:off x="4437776" y="3556932"/>
+            <a:ext cx="352338" cy="679508"/>
+          </a:xfrm>
+          <a:prstGeom prst="rect">
+            <a:avLst/>
+          </a:prstGeom>
+        </p:spPr>
+        <p:style>
+          <a:lnRef idx="2">
+            <a:schemeClr val="accent1">
+              <a:shade val="15000"/>
+            </a:schemeClr>
+          </a:lnRef>
+          <a:fillRef idx="1">
+            <a:schemeClr val="accent1"/>
+          </a:fillRef>
+          <a:effectRef idx="0">
+            <a:schemeClr val="accent1"/>
+          </a:effectRef>
+          <a:fontRef idx="minor">
+            <a:schemeClr val="lt1"/>
+          </a:fontRef>
+        </p:style>
+        <p:txBody>
+          <a:bodyPr rtlCol="0" anchor="ctr"/>
+          <a:lstStyle/>
+          <a:p>
+            <a:pPr algn="ctr"/>
+            <a:endParaRPr lang="de-DE"/>
+          </a:p>
+        </p:txBody>
+      </p:sp>
+      <p:sp>
+        <p:nvSpPr>
+          <p:cNvPr id="7" name="Rechteck 6">
+            <a:extLst>
+              <a:ext uri="{FF2B5EF4-FFF2-40B4-BE49-F238E27FC236}">
+                <a16:creationId xmlns:a16="http://schemas.microsoft.com/office/drawing/2014/main" id="{4696665C-3306-864F-59A1-E079AC923804}"/>
+              </a:ext>
+            </a:extLst>
+          </p:cNvPr>
+          <p:cNvSpPr/>
+          <p:nvPr/>
+        </p:nvSpPr>
+        <p:spPr>
+          <a:xfrm>
+            <a:off x="6911360" y="3509123"/>
+            <a:ext cx="352338" cy="679508"/>
+          </a:xfrm>
+          <a:prstGeom prst="rect">
+            <a:avLst/>
+          </a:prstGeom>
+        </p:spPr>
+        <p:style>
+          <a:lnRef idx="2">
+            <a:schemeClr val="accent1">
+              <a:shade val="15000"/>
+            </a:schemeClr>
+          </a:lnRef>
+          <a:fillRef idx="1">
+            <a:schemeClr val="accent1"/>
+          </a:fillRef>
+          <a:effectRef idx="0">
+            <a:schemeClr val="accent1"/>
+          </a:effectRef>
+          <a:fontRef idx="minor">
+            <a:schemeClr val="lt1"/>
+          </a:fontRef>
+        </p:style>
+        <p:txBody>
+          <a:bodyPr rtlCol="0" anchor="ctr"/>
+          <a:lstStyle/>
+          <a:p>
+            <a:pPr algn="ctr"/>
+            <a:endParaRPr lang="de-DE"/>
+          </a:p>
+        </p:txBody>
+      </p:sp>
+      <p:sp>
+        <p:nvSpPr>
+          <p:cNvPr id="8" name="Flussdiagramm: Verbinder 7">
+            <a:extLst>
+              <a:ext uri="{FF2B5EF4-FFF2-40B4-BE49-F238E27FC236}">
+                <a16:creationId xmlns:a16="http://schemas.microsoft.com/office/drawing/2014/main" id="{43A13D55-B3B3-CEBC-82F3-0F61FB20E72B}"/>
+              </a:ext>
+            </a:extLst>
+          </p:cNvPr>
+          <p:cNvSpPr/>
+          <p:nvPr/>
+        </p:nvSpPr>
+        <p:spPr>
+          <a:xfrm>
+            <a:off x="5188363" y="3798217"/>
+            <a:ext cx="184558" cy="194618"/>
+          </a:xfrm>
+          <a:prstGeom prst="flowChartConnector">
+            <a:avLst/>
+          </a:prstGeom>
+          <a:solidFill>
+            <a:schemeClr val="accent6"/>
+          </a:solidFill>
+        </p:spPr>
+        <p:style>
+          <a:lnRef idx="2">
+            <a:schemeClr val="accent1">
+              <a:shade val="15000"/>
+            </a:schemeClr>
+          </a:lnRef>
+          <a:fillRef idx="1">
+            <a:schemeClr val="accent1"/>
+          </a:fillRef>
+          <a:effectRef idx="0">
+            <a:schemeClr val="accent1"/>
+          </a:effectRef>
+          <a:fontRef idx="minor">
+            <a:schemeClr val="lt1"/>
+          </a:fontRef>
+        </p:style>
+        <p:txBody>
+          <a:bodyPr rtlCol="0" anchor="ctr"/>
+          <a:lstStyle/>
+          <a:p>
+            <a:pPr algn="ctr"/>
+            <a:endParaRPr lang="de-DE"/>
+          </a:p>
+        </p:txBody>
+      </p:sp>
+      <p:sp>
+        <p:nvSpPr>
+          <p:cNvPr id="9" name="Flussdiagramm: Verbinder 8">
+            <a:extLst>
+              <a:ext uri="{FF2B5EF4-FFF2-40B4-BE49-F238E27FC236}">
+                <a16:creationId xmlns:a16="http://schemas.microsoft.com/office/drawing/2014/main" id="{0D1436C3-6D2D-8F64-8A8D-53E0BC266D86}"/>
+              </a:ext>
+            </a:extLst>
+          </p:cNvPr>
+          <p:cNvSpPr/>
+          <p:nvPr/>
+        </p:nvSpPr>
+        <p:spPr>
+          <a:xfrm>
+            <a:off x="6820479" y="3801067"/>
+            <a:ext cx="184558" cy="194618"/>
+          </a:xfrm>
+          <a:prstGeom prst="flowChartConnector">
+            <a:avLst/>
+          </a:prstGeom>
+          <a:solidFill>
+            <a:schemeClr val="accent6"/>
+          </a:solidFill>
+        </p:spPr>
+        <p:style>
+          <a:lnRef idx="2">
+            <a:schemeClr val="accent1">
+              <a:shade val="15000"/>
+            </a:schemeClr>
+          </a:lnRef>
+          <a:fillRef idx="1">
+            <a:schemeClr val="accent1"/>
+          </a:fillRef>
+          <a:effectRef idx="0">
+            <a:schemeClr val="accent1"/>
+          </a:effectRef>
+          <a:fontRef idx="minor">
+            <a:schemeClr val="lt1"/>
+          </a:fontRef>
+        </p:style>
+        <p:txBody>
+          <a:bodyPr rtlCol="0" anchor="ctr"/>
+          <a:lstStyle/>
+          <a:p>
+            <a:pPr algn="ctr"/>
+            <a:endParaRPr lang="de-DE"/>
+          </a:p>
+        </p:txBody>
+      </p:sp>
+      <p:cxnSp>
+        <p:nvCxnSpPr>
+          <p:cNvPr id="11" name="Gerader Verbinder 10">
+            <a:extLst>
+              <a:ext uri="{FF2B5EF4-FFF2-40B4-BE49-F238E27FC236}">
+                <a16:creationId xmlns:a16="http://schemas.microsoft.com/office/drawing/2014/main" id="{DFE2FF69-0CF8-E009-FC6D-C8E9EFE954B1}"/>
+              </a:ext>
+            </a:extLst>
+          </p:cNvPr>
+          <p:cNvCxnSpPr>
+            <a:stCxn id="8" idx="6"/>
+            <a:endCxn id="9" idx="2"/>
+          </p:cNvCxnSpPr>
+          <p:nvPr/>
+        </p:nvCxnSpPr>
+        <p:spPr>
+          <a:xfrm>
+            <a:off x="5372921" y="3895526"/>
+            <a:ext cx="1447558" cy="2850"/>
+          </a:xfrm>
+          <a:prstGeom prst="line">
+            <a:avLst/>
+          </a:prstGeom>
+        </p:spPr>
+        <p:style>
+          <a:lnRef idx="2">
+            <a:schemeClr val="accent1"/>
+          </a:lnRef>
+          <a:fillRef idx="0">
+            <a:schemeClr val="accent1"/>
+          </a:fillRef>
+          <a:effectRef idx="1">
+            <a:schemeClr val="accent1"/>
+          </a:effectRef>
+          <a:fontRef idx="minor">
+            <a:schemeClr val="tx1"/>
+          </a:fontRef>
+        </p:style>
+      </p:cxnSp>
+      <p:sp>
+        <p:nvSpPr>
+          <p:cNvPr id="13" name="Textfeld 12">
+            <a:extLst>
+              <a:ext uri="{FF2B5EF4-FFF2-40B4-BE49-F238E27FC236}">
+                <a16:creationId xmlns:a16="http://schemas.microsoft.com/office/drawing/2014/main" id="{B58B152F-FE8F-01F7-0785-8FE673A0F3F5}"/>
+              </a:ext>
+            </a:extLst>
+          </p:cNvPr>
+          <p:cNvSpPr txBox="1"/>
+          <p:nvPr/>
+        </p:nvSpPr>
+        <p:spPr>
+          <a:xfrm>
+            <a:off x="4729099" y="3585969"/>
+            <a:ext cx="317716" cy="369332"/>
+          </a:xfrm>
+          <a:prstGeom prst="rect">
+            <a:avLst/>
+          </a:prstGeom>
+          <a:noFill/>
+        </p:spPr>
+        <p:txBody>
+          <a:bodyPr wrap="none" rtlCol="0">
+            <a:spAutoFit/>
+          </a:bodyPr>
+          <a:lstStyle/>
+          <a:p>
+            <a:r>
+              <a:rPr lang="de-DE" dirty="0"/>
+              <a:t>P</a:t>
+            </a:r>
+          </a:p>
+        </p:txBody>
+      </p:sp>
+      <p:sp>
+        <p:nvSpPr>
+          <p:cNvPr id="14" name="Textfeld 13">
+            <a:extLst>
+              <a:ext uri="{FF2B5EF4-FFF2-40B4-BE49-F238E27FC236}">
+                <a16:creationId xmlns:a16="http://schemas.microsoft.com/office/drawing/2014/main" id="{61925D38-4DAB-35A4-B1AA-9F3763575033}"/>
+              </a:ext>
+            </a:extLst>
+          </p:cNvPr>
+          <p:cNvSpPr txBox="1"/>
+          <p:nvPr/>
+        </p:nvSpPr>
+        <p:spPr>
+          <a:xfrm>
+            <a:off x="6619815" y="3575694"/>
+            <a:ext cx="317716" cy="369332"/>
+          </a:xfrm>
+          <a:prstGeom prst="rect">
+            <a:avLst/>
+          </a:prstGeom>
+          <a:noFill/>
+        </p:spPr>
+        <p:txBody>
+          <a:bodyPr wrap="none" rtlCol="0">
+            <a:spAutoFit/>
+          </a:bodyPr>
+          <a:lstStyle/>
+          <a:p>
+            <a:r>
+              <a:rPr lang="de-DE" dirty="0"/>
+              <a:t>P</a:t>
+            </a:r>
+          </a:p>
+        </p:txBody>
+      </p:sp>
+      <p:sp>
+        <p:nvSpPr>
+          <p:cNvPr id="3" name="Textfeld 2">
+            <a:extLst>
+              <a:ext uri="{FF2B5EF4-FFF2-40B4-BE49-F238E27FC236}">
+                <a16:creationId xmlns:a16="http://schemas.microsoft.com/office/drawing/2014/main" id="{DEDE1406-2AB0-F6E0-1BB9-11B503336D5A}"/>
+              </a:ext>
+            </a:extLst>
+          </p:cNvPr>
+          <p:cNvSpPr txBox="1"/>
+          <p:nvPr/>
+        </p:nvSpPr>
+        <p:spPr>
+          <a:xfrm>
+            <a:off x="3137483" y="3623503"/>
+            <a:ext cx="1110171" cy="369332"/>
+          </a:xfrm>
+          <a:prstGeom prst="rect">
+            <a:avLst/>
+          </a:prstGeom>
+          <a:noFill/>
+        </p:spPr>
+        <p:txBody>
+          <a:bodyPr wrap="square" rtlCol="0">
+            <a:spAutoFit/>
+          </a:bodyPr>
+          <a:lstStyle/>
+          <a:p>
+            <a:r>
+              <a:rPr lang="de-DE" dirty="0"/>
+              <a:t>PV</a:t>
+            </a:r>
+          </a:p>
+        </p:txBody>
+      </p:sp>
+      <p:sp>
+        <p:nvSpPr>
+          <p:cNvPr id="10" name="Textfeld 9">
+            <a:extLst>
+              <a:ext uri="{FF2B5EF4-FFF2-40B4-BE49-F238E27FC236}">
+                <a16:creationId xmlns:a16="http://schemas.microsoft.com/office/drawing/2014/main" id="{E4420A05-FDEE-E86E-3B7E-4118E2CF0E83}"/>
+              </a:ext>
+            </a:extLst>
+          </p:cNvPr>
+          <p:cNvSpPr txBox="1"/>
+          <p:nvPr/>
+        </p:nvSpPr>
+        <p:spPr>
+          <a:xfrm>
+            <a:off x="7319133" y="3248712"/>
+            <a:ext cx="1452220" cy="1200329"/>
+          </a:xfrm>
+          <a:prstGeom prst="rect">
+            <a:avLst/>
+          </a:prstGeom>
+          <a:noFill/>
+        </p:spPr>
+        <p:txBody>
+          <a:bodyPr wrap="square" rtlCol="0">
+            <a:spAutoFit/>
+          </a:bodyPr>
+          <a:lstStyle/>
+          <a:p>
+            <a:r>
+              <a:rPr lang="de-DE" dirty="0"/>
+              <a:t>Main </a:t>
+            </a:r>
+            <a:r>
+              <a:rPr lang="de-DE" dirty="0" err="1"/>
+              <a:t>Grid</a:t>
+            </a:r>
+            <a:endParaRPr lang="de-DE" dirty="0"/>
+          </a:p>
+          <a:p>
+            <a:endParaRPr lang="de-DE" dirty="0"/>
+          </a:p>
+          <a:p>
+            <a:r>
+              <a:rPr lang="de-DE" dirty="0"/>
+              <a:t>Time </a:t>
+            </a:r>
+            <a:r>
+              <a:rPr lang="de-DE" dirty="0" err="1"/>
+              <a:t>seriesf</a:t>
+            </a:r>
+            <a:r>
+              <a:rPr lang="de-DE" dirty="0"/>
+              <a:t>(t)</a:t>
+            </a:r>
+          </a:p>
+        </p:txBody>
+      </p:sp>
+      <p:sp>
+        <p:nvSpPr>
+          <p:cNvPr id="12" name="Rechteck 11">
+            <a:extLst>
+              <a:ext uri="{FF2B5EF4-FFF2-40B4-BE49-F238E27FC236}">
+                <a16:creationId xmlns:a16="http://schemas.microsoft.com/office/drawing/2014/main" id="{4EBF8EBD-2E1B-D4A0-E237-3B9E3295D9CC}"/>
+              </a:ext>
+            </a:extLst>
+          </p:cNvPr>
+          <p:cNvSpPr/>
+          <p:nvPr/>
+        </p:nvSpPr>
+        <p:spPr>
+          <a:xfrm>
+            <a:off x="2710177" y="4779968"/>
+            <a:ext cx="1828800" cy="1278293"/>
+          </a:xfrm>
+          <a:prstGeom prst="rect">
+            <a:avLst/>
+          </a:prstGeom>
+          <a:noFill/>
+        </p:spPr>
+        <p:style>
+          <a:lnRef idx="2">
+            <a:schemeClr val="accent1">
+              <a:shade val="15000"/>
+            </a:schemeClr>
+          </a:lnRef>
+          <a:fillRef idx="1">
+            <a:schemeClr val="accent1"/>
+          </a:fillRef>
+          <a:effectRef idx="0">
+            <a:schemeClr val="accent1"/>
+          </a:effectRef>
+          <a:fontRef idx="minor">
+            <a:schemeClr val="lt1"/>
+          </a:fontRef>
+        </p:style>
+        <p:txBody>
+          <a:bodyPr rtlCol="0" anchor="ctr"/>
+          <a:lstStyle/>
+          <a:p>
+            <a:pPr algn="ctr"/>
+            <a:endParaRPr lang="de-DE"/>
+          </a:p>
+        </p:txBody>
+      </p:sp>
+      <p:sp>
+        <p:nvSpPr>
+          <p:cNvPr id="15" name="Rechteck 14">
+            <a:extLst>
+              <a:ext uri="{FF2B5EF4-FFF2-40B4-BE49-F238E27FC236}">
+                <a16:creationId xmlns:a16="http://schemas.microsoft.com/office/drawing/2014/main" id="{3562031C-B1A8-B45E-F864-DCF7ED7D46FA}"/>
+              </a:ext>
+            </a:extLst>
+          </p:cNvPr>
+          <p:cNvSpPr/>
+          <p:nvPr/>
+        </p:nvSpPr>
+        <p:spPr>
+          <a:xfrm>
+            <a:off x="4376761" y="5127169"/>
+            <a:ext cx="352338" cy="679508"/>
+          </a:xfrm>
+          <a:prstGeom prst="rect">
+            <a:avLst/>
+          </a:prstGeom>
+        </p:spPr>
+        <p:style>
+          <a:lnRef idx="2">
+            <a:schemeClr val="accent1">
+              <a:shade val="15000"/>
+            </a:schemeClr>
+          </a:lnRef>
+          <a:fillRef idx="1">
+            <a:schemeClr val="accent1"/>
+          </a:fillRef>
+          <a:effectRef idx="0">
+            <a:schemeClr val="accent1"/>
+          </a:effectRef>
+          <a:fontRef idx="minor">
+            <a:schemeClr val="lt1"/>
+          </a:fontRef>
+        </p:style>
+        <p:txBody>
+          <a:bodyPr rtlCol="0" anchor="ctr"/>
+          <a:lstStyle/>
+          <a:p>
+            <a:pPr algn="ctr"/>
+            <a:endParaRPr lang="de-DE"/>
+          </a:p>
+        </p:txBody>
+      </p:sp>
+      <p:sp>
+        <p:nvSpPr>
+          <p:cNvPr id="16" name="Textfeld 15">
+            <a:extLst>
+              <a:ext uri="{FF2B5EF4-FFF2-40B4-BE49-F238E27FC236}">
+                <a16:creationId xmlns:a16="http://schemas.microsoft.com/office/drawing/2014/main" id="{9BA3A3FC-EE12-E1C7-39E8-729874E5A679}"/>
+              </a:ext>
+            </a:extLst>
+          </p:cNvPr>
+          <p:cNvSpPr txBox="1"/>
+          <p:nvPr/>
+        </p:nvSpPr>
+        <p:spPr>
+          <a:xfrm>
+            <a:off x="2857031" y="5030318"/>
+            <a:ext cx="1277071" cy="923330"/>
+          </a:xfrm>
+          <a:prstGeom prst="rect">
+            <a:avLst/>
+          </a:prstGeom>
+          <a:noFill/>
+        </p:spPr>
+        <p:txBody>
+          <a:bodyPr wrap="square" rtlCol="0">
+            <a:spAutoFit/>
+          </a:bodyPr>
+          <a:lstStyle/>
+          <a:p>
+            <a:r>
+              <a:rPr lang="de-DE" dirty="0" err="1"/>
+              <a:t>Battery</a:t>
+            </a:r>
+            <a:endParaRPr lang="de-DE" dirty="0"/>
+          </a:p>
+          <a:p>
+            <a:r>
+              <a:rPr lang="de-DE" dirty="0" err="1"/>
+              <a:t>Variable:P</a:t>
+            </a:r>
+            <a:r>
+              <a:rPr lang="de-DE" dirty="0"/>
+              <a:t>(f)</a:t>
+            </a:r>
+          </a:p>
+        </p:txBody>
+      </p:sp>
+      <p:cxnSp>
+        <p:nvCxnSpPr>
+          <p:cNvPr id="18" name="Verbinder: gewinkelt 17">
+            <a:extLst>
+              <a:ext uri="{FF2B5EF4-FFF2-40B4-BE49-F238E27FC236}">
+                <a16:creationId xmlns:a16="http://schemas.microsoft.com/office/drawing/2014/main" id="{E553ECD4-D1EF-9E9A-B57A-5F0F0190EBA4}"/>
+              </a:ext>
+            </a:extLst>
+          </p:cNvPr>
+          <p:cNvCxnSpPr>
+            <a:cxnSpLocks/>
+          </p:cNvCxnSpPr>
+          <p:nvPr/>
+        </p:nvCxnSpPr>
+        <p:spPr>
+          <a:xfrm rot="5400000">
+            <a:off x="4255804" y="4430331"/>
+            <a:ext cx="1442814" cy="595765"/>
+          </a:xfrm>
+          <a:prstGeom prst="bentConnector2">
+            <a:avLst/>
+          </a:prstGeom>
+        </p:spPr>
+        <p:style>
+          <a:lnRef idx="2">
+            <a:schemeClr val="accent1"/>
+          </a:lnRef>
+          <a:fillRef idx="0">
+            <a:schemeClr val="accent1"/>
+          </a:fillRef>
+          <a:effectRef idx="1">
+            <a:schemeClr val="accent1"/>
+          </a:effectRef>
+          <a:fontRef idx="minor">
+            <a:schemeClr val="tx1"/>
+          </a:fontRef>
+        </p:style>
+      </p:cxnSp>
+      <p:sp>
+        <p:nvSpPr>
+          <p:cNvPr id="22" name="Flussdiagramm: Verbinder 21">
+            <a:extLst>
+              <a:ext uri="{FF2B5EF4-FFF2-40B4-BE49-F238E27FC236}">
+                <a16:creationId xmlns:a16="http://schemas.microsoft.com/office/drawing/2014/main" id="{4BD4D5C1-A481-B46B-3A3E-9CFF34AE34B6}"/>
+              </a:ext>
+            </a:extLst>
+          </p:cNvPr>
+          <p:cNvSpPr/>
+          <p:nvPr/>
+        </p:nvSpPr>
+        <p:spPr>
+          <a:xfrm>
+            <a:off x="4583731" y="5394674"/>
+            <a:ext cx="184558" cy="194618"/>
+          </a:xfrm>
+          <a:prstGeom prst="flowChartConnector">
+            <a:avLst/>
+          </a:prstGeom>
+          <a:solidFill>
+            <a:schemeClr val="accent6"/>
+          </a:solidFill>
+        </p:spPr>
+        <p:style>
+          <a:lnRef idx="2">
+            <a:schemeClr val="accent1">
+              <a:shade val="15000"/>
+            </a:schemeClr>
+          </a:lnRef>
+          <a:fillRef idx="1">
+            <a:schemeClr val="accent1"/>
+          </a:fillRef>
+          <a:effectRef idx="0">
+            <a:schemeClr val="accent1"/>
+          </a:effectRef>
+          <a:fontRef idx="minor">
+            <a:schemeClr val="lt1"/>
+          </a:fontRef>
+        </p:style>
+        <p:txBody>
+          <a:bodyPr rtlCol="0" anchor="ctr"/>
+          <a:lstStyle/>
+          <a:p>
+            <a:pPr algn="ctr"/>
+            <a:endParaRPr lang="de-DE"/>
+          </a:p>
+        </p:txBody>
+      </p:sp>
+      <p:sp>
+        <p:nvSpPr>
+          <p:cNvPr id="17" name="Rechteck 16">
+            <a:extLst>
+              <a:ext uri="{FF2B5EF4-FFF2-40B4-BE49-F238E27FC236}">
+                <a16:creationId xmlns:a16="http://schemas.microsoft.com/office/drawing/2014/main" id="{0495C7CF-F716-7801-B0DB-F7FE7FDD2C3C}"/>
+              </a:ext>
+            </a:extLst>
+          </p:cNvPr>
+          <p:cNvSpPr/>
+          <p:nvPr/>
+        </p:nvSpPr>
+        <p:spPr>
+          <a:xfrm>
+            <a:off x="2771192" y="1348957"/>
+            <a:ext cx="1828800" cy="1278293"/>
+          </a:xfrm>
+          <a:prstGeom prst="rect">
+            <a:avLst/>
+          </a:prstGeom>
+          <a:noFill/>
+        </p:spPr>
+        <p:style>
+          <a:lnRef idx="2">
+            <a:schemeClr val="accent1">
+              <a:shade val="15000"/>
+            </a:schemeClr>
+          </a:lnRef>
+          <a:fillRef idx="1">
+            <a:schemeClr val="accent1"/>
+          </a:fillRef>
+          <a:effectRef idx="0">
+            <a:schemeClr val="accent1"/>
+          </a:effectRef>
+          <a:fontRef idx="minor">
+            <a:schemeClr val="lt1"/>
+          </a:fontRef>
+        </p:style>
+        <p:txBody>
+          <a:bodyPr rtlCol="0" anchor="ctr"/>
+          <a:lstStyle/>
+          <a:p>
+            <a:pPr algn="ctr"/>
+            <a:endParaRPr lang="de-DE"/>
+          </a:p>
+        </p:txBody>
+      </p:sp>
+      <p:sp>
+        <p:nvSpPr>
+          <p:cNvPr id="19" name="Rechteck 18">
+            <a:extLst>
+              <a:ext uri="{FF2B5EF4-FFF2-40B4-BE49-F238E27FC236}">
+                <a16:creationId xmlns:a16="http://schemas.microsoft.com/office/drawing/2014/main" id="{2A242BA6-9967-C1A5-DD43-59A24FF7548E}"/>
+              </a:ext>
+            </a:extLst>
+          </p:cNvPr>
+          <p:cNvSpPr/>
+          <p:nvPr/>
+        </p:nvSpPr>
+        <p:spPr>
+          <a:xfrm>
+            <a:off x="4437776" y="1696158"/>
+            <a:ext cx="352338" cy="679508"/>
+          </a:xfrm>
+          <a:prstGeom prst="rect">
+            <a:avLst/>
+          </a:prstGeom>
+        </p:spPr>
+        <p:style>
+          <a:lnRef idx="2">
+            <a:schemeClr val="accent1">
+              <a:shade val="15000"/>
+            </a:schemeClr>
+          </a:lnRef>
+          <a:fillRef idx="1">
+            <a:schemeClr val="accent1"/>
+          </a:fillRef>
+          <a:effectRef idx="0">
+            <a:schemeClr val="accent1"/>
+          </a:effectRef>
+          <a:fontRef idx="minor">
+            <a:schemeClr val="lt1"/>
+          </a:fontRef>
+        </p:style>
+        <p:txBody>
+          <a:bodyPr rtlCol="0" anchor="ctr"/>
+          <a:lstStyle/>
+          <a:p>
+            <a:pPr algn="ctr"/>
+            <a:endParaRPr lang="de-DE"/>
+          </a:p>
+        </p:txBody>
+      </p:sp>
+      <p:sp>
+        <p:nvSpPr>
+          <p:cNvPr id="20" name="Textfeld 19">
+            <a:extLst>
+              <a:ext uri="{FF2B5EF4-FFF2-40B4-BE49-F238E27FC236}">
+                <a16:creationId xmlns:a16="http://schemas.microsoft.com/office/drawing/2014/main" id="{07F25CA5-143A-B56F-1077-4FE65D388F72}"/>
+              </a:ext>
+            </a:extLst>
+          </p:cNvPr>
+          <p:cNvSpPr txBox="1"/>
+          <p:nvPr/>
+        </p:nvSpPr>
+        <p:spPr>
+          <a:xfrm>
+            <a:off x="4870647" y="1567789"/>
+            <a:ext cx="317716" cy="369332"/>
+          </a:xfrm>
+          <a:prstGeom prst="rect">
+            <a:avLst/>
+          </a:prstGeom>
+          <a:noFill/>
+        </p:spPr>
+        <p:txBody>
+          <a:bodyPr wrap="none" rtlCol="0">
+            <a:spAutoFit/>
+          </a:bodyPr>
+          <a:lstStyle/>
+          <a:p>
+            <a:r>
+              <a:rPr lang="de-DE" dirty="0"/>
+              <a:t>P</a:t>
+            </a:r>
+          </a:p>
+        </p:txBody>
+      </p:sp>
+      <p:sp>
+        <p:nvSpPr>
+          <p:cNvPr id="21" name="Textfeld 20">
+            <a:extLst>
+              <a:ext uri="{FF2B5EF4-FFF2-40B4-BE49-F238E27FC236}">
+                <a16:creationId xmlns:a16="http://schemas.microsoft.com/office/drawing/2014/main" id="{DF229632-D950-CB92-2F10-8A0E66FCC573}"/>
+              </a:ext>
+            </a:extLst>
+          </p:cNvPr>
+          <p:cNvSpPr txBox="1"/>
+          <p:nvPr/>
+        </p:nvSpPr>
+        <p:spPr>
+          <a:xfrm>
+            <a:off x="3137483" y="1762729"/>
+            <a:ext cx="1110171" cy="369332"/>
+          </a:xfrm>
+          <a:prstGeom prst="rect">
+            <a:avLst/>
+          </a:prstGeom>
+          <a:noFill/>
+        </p:spPr>
+        <p:txBody>
+          <a:bodyPr wrap="square" rtlCol="0">
+            <a:spAutoFit/>
+          </a:bodyPr>
+          <a:lstStyle/>
+          <a:p>
+            <a:r>
+              <a:rPr lang="de-DE" dirty="0"/>
+              <a:t>Load</a:t>
+            </a:r>
+          </a:p>
+        </p:txBody>
+      </p:sp>
+      <p:sp>
+        <p:nvSpPr>
+          <p:cNvPr id="31" name="Flussdiagramm: Verbinder 30">
+            <a:extLst>
+              <a:ext uri="{FF2B5EF4-FFF2-40B4-BE49-F238E27FC236}">
+                <a16:creationId xmlns:a16="http://schemas.microsoft.com/office/drawing/2014/main" id="{90FBA058-938A-CCF7-F1C3-D28999E39B64}"/>
+              </a:ext>
+            </a:extLst>
+          </p:cNvPr>
+          <p:cNvSpPr/>
+          <p:nvPr/>
+        </p:nvSpPr>
+        <p:spPr>
+          <a:xfrm>
+            <a:off x="4734130" y="1794817"/>
+            <a:ext cx="184558" cy="194618"/>
+          </a:xfrm>
+          <a:prstGeom prst="flowChartConnector">
+            <a:avLst/>
+          </a:prstGeom>
+          <a:solidFill>
+            <a:schemeClr val="accent6"/>
+          </a:solidFill>
+        </p:spPr>
+        <p:style>
+          <a:lnRef idx="2">
+            <a:schemeClr val="accent1">
+              <a:shade val="15000"/>
+            </a:schemeClr>
+          </a:lnRef>
+          <a:fillRef idx="1">
+            <a:schemeClr val="accent1"/>
+          </a:fillRef>
+          <a:effectRef idx="0">
+            <a:schemeClr val="accent1"/>
+          </a:effectRef>
+          <a:fontRef idx="minor">
+            <a:schemeClr val="lt1"/>
+          </a:fontRef>
+        </p:style>
+        <p:txBody>
+          <a:bodyPr rtlCol="0" anchor="ctr"/>
+          <a:lstStyle/>
+          <a:p>
+            <a:pPr algn="ctr"/>
+            <a:endParaRPr lang="de-DE"/>
+          </a:p>
+        </p:txBody>
+      </p:sp>
+      <p:cxnSp>
+        <p:nvCxnSpPr>
+          <p:cNvPr id="37" name="Verbinder: gewinkelt 36">
+            <a:extLst>
+              <a:ext uri="{FF2B5EF4-FFF2-40B4-BE49-F238E27FC236}">
+                <a16:creationId xmlns:a16="http://schemas.microsoft.com/office/drawing/2014/main" id="{74698230-23FE-D1C5-5DC1-F8AA1BD42491}"/>
+              </a:ext>
+            </a:extLst>
+          </p:cNvPr>
+          <p:cNvCxnSpPr>
+            <a:cxnSpLocks/>
+            <a:stCxn id="31" idx="6"/>
+            <a:endCxn id="8" idx="0"/>
+          </p:cNvCxnSpPr>
+          <p:nvPr/>
+        </p:nvCxnSpPr>
+        <p:spPr>
+          <a:xfrm>
+            <a:off x="4918688" y="1892126"/>
+            <a:ext cx="361954" cy="1906091"/>
+          </a:xfrm>
+          <a:prstGeom prst="bentConnector2">
+            <a:avLst/>
+          </a:prstGeom>
+        </p:spPr>
+        <p:style>
+          <a:lnRef idx="2">
+            <a:schemeClr val="accent1"/>
+          </a:lnRef>
+          <a:fillRef idx="0">
+            <a:schemeClr val="accent1"/>
+          </a:fillRef>
+          <a:effectRef idx="1">
+            <a:schemeClr val="accent1"/>
+          </a:effectRef>
+          <a:fontRef idx="minor">
+            <a:schemeClr val="tx1"/>
+          </a:fontRef>
+        </p:style>
+      </p:cxnSp>
+      <p:cxnSp>
+        <p:nvCxnSpPr>
+          <p:cNvPr id="43" name="Gerader Verbinder 42">
+            <a:extLst>
+              <a:ext uri="{FF2B5EF4-FFF2-40B4-BE49-F238E27FC236}">
+                <a16:creationId xmlns:a16="http://schemas.microsoft.com/office/drawing/2014/main" id="{C9D4C5ED-2368-BAA1-D3EA-8980EE90311A}"/>
+              </a:ext>
+            </a:extLst>
+          </p:cNvPr>
+          <p:cNvCxnSpPr>
+            <a:stCxn id="8" idx="2"/>
+            <a:endCxn id="6" idx="3"/>
+          </p:cNvCxnSpPr>
+          <p:nvPr/>
+        </p:nvCxnSpPr>
+        <p:spPr>
+          <a:xfrm flipH="1">
+            <a:off x="4790114" y="3895526"/>
+            <a:ext cx="398249" cy="1160"/>
+          </a:xfrm>
+          <a:prstGeom prst="line">
+            <a:avLst/>
+          </a:prstGeom>
+        </p:spPr>
+        <p:style>
+          <a:lnRef idx="2">
+            <a:schemeClr val="accent1"/>
+          </a:lnRef>
+          <a:fillRef idx="0">
+            <a:schemeClr val="accent1"/>
+          </a:fillRef>
+          <a:effectRef idx="1">
+            <a:schemeClr val="accent1"/>
+          </a:effectRef>
+          <a:fontRef idx="minor">
+            <a:schemeClr val="tx1"/>
+          </a:fontRef>
+        </p:style>
+      </p:cxnSp>
+      <p:sp>
+        <p:nvSpPr>
+          <p:cNvPr id="51" name="Textfeld 50">
+            <a:extLst>
+              <a:ext uri="{FF2B5EF4-FFF2-40B4-BE49-F238E27FC236}">
+                <a16:creationId xmlns:a16="http://schemas.microsoft.com/office/drawing/2014/main" id="{41B1A4DC-510C-2E94-8759-887CFA2A9BC4}"/>
+              </a:ext>
+            </a:extLst>
+          </p:cNvPr>
+          <p:cNvSpPr txBox="1"/>
+          <p:nvPr/>
+        </p:nvSpPr>
+        <p:spPr>
+          <a:xfrm>
+            <a:off x="4685831" y="5143090"/>
+            <a:ext cx="317716" cy="369332"/>
+          </a:xfrm>
+          <a:prstGeom prst="rect">
+            <a:avLst/>
+          </a:prstGeom>
+          <a:noFill/>
+        </p:spPr>
+        <p:txBody>
+          <a:bodyPr wrap="none" rtlCol="0">
+            <a:spAutoFit/>
+          </a:bodyPr>
+          <a:lstStyle/>
+          <a:p>
+            <a:r>
+              <a:rPr lang="de-DE" dirty="0"/>
+              <a:t>P</a:t>
+            </a:r>
+          </a:p>
+        </p:txBody>
+      </p:sp>
+    </p:spTree>
+    <p:extLst>
+      <p:ext uri="{BB962C8B-B14F-4D97-AF65-F5344CB8AC3E}">
+        <p14:creationId xmlns:p14="http://schemas.microsoft.com/office/powerpoint/2010/main" val="855068026"/>
+      </p:ext>
+    </p:extLst>
+  </p:cSld>
+  <p:clrMapOvr>
+    <a:masterClrMapping/>
+  </p:clrMapOvr>
+</p:sld>
+</file>
+
+<file path=ppt/slides/slide5.xml><?xml version="1.0" encoding="utf-8"?>
+<p:sld xmlns:a="http://schemas.openxmlformats.org/drawingml/2006/main" xmlns:r="http://schemas.openxmlformats.org/officeDocument/2006/relationships" xmlns:p="http://schemas.openxmlformats.org/presentationml/2006/main">
+  <p:cSld>
+    <p:spTree>
+      <p:nvGrpSpPr>
+        <p:cNvPr id="1" name=""/>
+        <p:cNvGrpSpPr/>
+        <p:nvPr/>
+      </p:nvGrpSpPr>
+      <p:grpSpPr>
+        <a:xfrm>
+          <a:off x="0" y="0"/>
+          <a:ext cx="0" cy="0"/>
+          <a:chOff x="0" y="0"/>
+          <a:chExt cx="0" cy="0"/>
+        </a:xfrm>
+      </p:grpSpPr>
+      <p:sp>
+        <p:nvSpPr>
+          <p:cNvPr id="2" name="Titel 1">
+            <a:extLst>
+              <a:ext uri="{FF2B5EF4-FFF2-40B4-BE49-F238E27FC236}">
+                <a16:creationId xmlns:a16="http://schemas.microsoft.com/office/drawing/2014/main" id="{377465B9-3DE4-571F-3B82-07D62B46DF49}"/>
+              </a:ext>
+            </a:extLst>
+          </p:cNvPr>
+          <p:cNvSpPr>
+            <a:spLocks noGrp="1"/>
+          </p:cNvSpPr>
+          <p:nvPr>
+            <p:ph type="title"/>
+          </p:nvPr>
+        </p:nvSpPr>
+        <p:spPr/>
+        <p:txBody>
+          <a:bodyPr/>
+          <a:lstStyle/>
+          <a:p>
+            <a:endParaRPr lang="de-DE"/>
+          </a:p>
+        </p:txBody>
+      </p:sp>
+      <p:sp>
+        <p:nvSpPr>
+          <p:cNvPr id="3" name="Inhaltsplatzhalter 2">
+            <a:extLst>
+              <a:ext uri="{FF2B5EF4-FFF2-40B4-BE49-F238E27FC236}">
+                <a16:creationId xmlns:a16="http://schemas.microsoft.com/office/drawing/2014/main" id="{A0B5F685-3688-5DB0-B13B-16A87FC4A29E}"/>
+              </a:ext>
+            </a:extLst>
+          </p:cNvPr>
+          <p:cNvSpPr>
+            <a:spLocks noGrp="1"/>
+          </p:cNvSpPr>
+          <p:nvPr>
+            <p:ph idx="1"/>
+          </p:nvPr>
+        </p:nvSpPr>
+        <p:spPr/>
+        <p:txBody>
+          <a:bodyPr/>
+          <a:lstStyle/>
+          <a:p>
+            <a:r>
+              <a:rPr lang="de-DE" dirty="0">
+                <a:highlight>
+                  <a:srgbClr val="FFFF00"/>
+                </a:highlight>
+              </a:rPr>
+              <a:t>ExampleBatteryPV8760Opt.py</a:t>
+            </a:r>
+            <a:r>
+              <a:rPr lang="de-DE" dirty="0"/>
+              <a:t>: </a:t>
+            </a:r>
+            <a:r>
+              <a:rPr lang="de-DE" dirty="0" err="1"/>
+              <a:t>One</a:t>
+            </a:r>
+            <a:r>
+              <a:rPr lang="de-DE" dirty="0"/>
+              <a:t> </a:t>
+            </a:r>
+            <a:r>
+              <a:rPr lang="de-DE" dirty="0" err="1"/>
+              <a:t>year</a:t>
+            </a:r>
+            <a:r>
+              <a:rPr lang="de-DE" dirty="0"/>
+              <a:t> </a:t>
+            </a:r>
+            <a:r>
+              <a:rPr lang="de-DE" dirty="0" err="1"/>
+              <a:t>optimization</a:t>
+            </a:r>
+            <a:r>
+              <a:rPr lang="de-DE" dirty="0"/>
+              <a:t> </a:t>
+            </a:r>
+            <a:r>
+              <a:rPr lang="de-DE" dirty="0" err="1"/>
+              <a:t>of</a:t>
+            </a:r>
+            <a:r>
+              <a:rPr lang="de-DE" dirty="0"/>
+              <a:t> </a:t>
+            </a:r>
+            <a:r>
+              <a:rPr lang="de-DE" dirty="0" err="1"/>
+              <a:t>the</a:t>
+            </a:r>
+            <a:r>
+              <a:rPr lang="de-DE" dirty="0"/>
+              <a:t> PV power plant</a:t>
+            </a:r>
+          </a:p>
+          <a:p>
+            <a:r>
+              <a:rPr lang="de-DE" dirty="0">
+                <a:highlight>
+                  <a:srgbClr val="FFFF00"/>
+                </a:highlight>
+              </a:rPr>
+              <a:t>ExampleBatteryPVOpt.py</a:t>
+            </a:r>
+            <a:r>
+              <a:rPr lang="de-DE" dirty="0"/>
+              <a:t>: 50 </a:t>
+            </a:r>
+            <a:r>
+              <a:rPr lang="de-DE" dirty="0" err="1"/>
+              <a:t>hours</a:t>
+            </a:r>
+            <a:r>
+              <a:rPr lang="de-DE" dirty="0"/>
+              <a:t> </a:t>
+            </a:r>
+            <a:r>
+              <a:rPr lang="de-DE" dirty="0" err="1"/>
+              <a:t>optimization</a:t>
+            </a:r>
+            <a:r>
+              <a:rPr lang="de-DE" dirty="0"/>
+              <a:t> </a:t>
+            </a:r>
+            <a:r>
+              <a:rPr lang="de-DE" dirty="0" err="1"/>
+              <a:t>of</a:t>
+            </a:r>
+            <a:r>
+              <a:rPr lang="de-DE" dirty="0"/>
+              <a:t> </a:t>
+            </a:r>
+            <a:r>
+              <a:rPr lang="de-DE" dirty="0" err="1"/>
+              <a:t>th</a:t>
+            </a:r>
+            <a:r>
+              <a:rPr lang="de-DE" dirty="0"/>
+              <a:t> PV power plant</a:t>
+            </a:r>
+          </a:p>
+        </p:txBody>
+      </p:sp>
+    </p:spTree>
+    <p:extLst>
+      <p:ext uri="{BB962C8B-B14F-4D97-AF65-F5344CB8AC3E}">
+        <p14:creationId xmlns:p14="http://schemas.microsoft.com/office/powerpoint/2010/main" val="2926034169"/>
       </p:ext>
     </p:extLst>
   </p:cSld>

</xml_diff>

<commit_message>
Update 12.08.2024 Sumulation results showing different results
</commit_message>
<xml_diff>
--- a/main/ExampleBattery.pptx
+++ b/main/ExampleBattery.pptx
@@ -263,7 +263,7 @@
           <a:p>
             <a:fld id="{217BF3B2-92C1-4518-AED7-C6BBE55D17D1}" type="datetimeFigureOut">
               <a:rPr lang="de-DE" smtClean="0"/>
-              <a:t>18.04.2024</a:t>
+              <a:t>22.01.2025</a:t>
             </a:fld>
             <a:endParaRPr lang="de-DE"/>
           </a:p>
@@ -461,7 +461,7 @@
           <a:p>
             <a:fld id="{217BF3B2-92C1-4518-AED7-C6BBE55D17D1}" type="datetimeFigureOut">
               <a:rPr lang="de-DE" smtClean="0"/>
-              <a:t>18.04.2024</a:t>
+              <a:t>22.01.2025</a:t>
             </a:fld>
             <a:endParaRPr lang="de-DE"/>
           </a:p>
@@ -669,7 +669,7 @@
           <a:p>
             <a:fld id="{217BF3B2-92C1-4518-AED7-C6BBE55D17D1}" type="datetimeFigureOut">
               <a:rPr lang="de-DE" smtClean="0"/>
-              <a:t>18.04.2024</a:t>
+              <a:t>22.01.2025</a:t>
             </a:fld>
             <a:endParaRPr lang="de-DE"/>
           </a:p>
@@ -867,7 +867,7 @@
           <a:p>
             <a:fld id="{217BF3B2-92C1-4518-AED7-C6BBE55D17D1}" type="datetimeFigureOut">
               <a:rPr lang="de-DE" smtClean="0"/>
-              <a:t>18.04.2024</a:t>
+              <a:t>22.01.2025</a:t>
             </a:fld>
             <a:endParaRPr lang="de-DE"/>
           </a:p>
@@ -1142,7 +1142,7 @@
           <a:p>
             <a:fld id="{217BF3B2-92C1-4518-AED7-C6BBE55D17D1}" type="datetimeFigureOut">
               <a:rPr lang="de-DE" smtClean="0"/>
-              <a:t>18.04.2024</a:t>
+              <a:t>22.01.2025</a:t>
             </a:fld>
             <a:endParaRPr lang="de-DE"/>
           </a:p>
@@ -1407,7 +1407,7 @@
           <a:p>
             <a:fld id="{217BF3B2-92C1-4518-AED7-C6BBE55D17D1}" type="datetimeFigureOut">
               <a:rPr lang="de-DE" smtClean="0"/>
-              <a:t>18.04.2024</a:t>
+              <a:t>22.01.2025</a:t>
             </a:fld>
             <a:endParaRPr lang="de-DE"/>
           </a:p>
@@ -1819,7 +1819,7 @@
           <a:p>
             <a:fld id="{217BF3B2-92C1-4518-AED7-C6BBE55D17D1}" type="datetimeFigureOut">
               <a:rPr lang="de-DE" smtClean="0"/>
-              <a:t>18.04.2024</a:t>
+              <a:t>22.01.2025</a:t>
             </a:fld>
             <a:endParaRPr lang="de-DE"/>
           </a:p>
@@ -1960,7 +1960,7 @@
           <a:p>
             <a:fld id="{217BF3B2-92C1-4518-AED7-C6BBE55D17D1}" type="datetimeFigureOut">
               <a:rPr lang="de-DE" smtClean="0"/>
-              <a:t>18.04.2024</a:t>
+              <a:t>22.01.2025</a:t>
             </a:fld>
             <a:endParaRPr lang="de-DE"/>
           </a:p>
@@ -2073,7 +2073,7 @@
           <a:p>
             <a:fld id="{217BF3B2-92C1-4518-AED7-C6BBE55D17D1}" type="datetimeFigureOut">
               <a:rPr lang="de-DE" smtClean="0"/>
-              <a:t>18.04.2024</a:t>
+              <a:t>22.01.2025</a:t>
             </a:fld>
             <a:endParaRPr lang="de-DE"/>
           </a:p>
@@ -2384,7 +2384,7 @@
           <a:p>
             <a:fld id="{217BF3B2-92C1-4518-AED7-C6BBE55D17D1}" type="datetimeFigureOut">
               <a:rPr lang="de-DE" smtClean="0"/>
-              <a:t>18.04.2024</a:t>
+              <a:t>22.01.2025</a:t>
             </a:fld>
             <a:endParaRPr lang="de-DE"/>
           </a:p>
@@ -2672,7 +2672,7 @@
           <a:p>
             <a:fld id="{217BF3B2-92C1-4518-AED7-C6BBE55D17D1}" type="datetimeFigureOut">
               <a:rPr lang="de-DE" smtClean="0"/>
-              <a:t>18.04.2024</a:t>
+              <a:t>22.01.2025</a:t>
             </a:fld>
             <a:endParaRPr lang="de-DE"/>
           </a:p>
@@ -2913,7 +2913,7 @@
           <a:p>
             <a:fld id="{217BF3B2-92C1-4518-AED7-C6BBE55D17D1}" type="datetimeFigureOut">
               <a:rPr lang="de-DE" smtClean="0"/>
-              <a:t>18.04.2024</a:t>
+              <a:t>22.01.2025</a:t>
             </a:fld>
             <a:endParaRPr lang="de-DE"/>
           </a:p>
@@ -3895,13 +3895,8 @@
           <a:p>
             <a:r>
               <a:rPr lang="de-DE" dirty="0"/>
-              <a:t>Main </a:t>
-            </a:r>
-            <a:r>
-              <a:rPr lang="de-DE" dirty="0" err="1"/>
-              <a:t>Grid</a:t>
-            </a:r>
-            <a:endParaRPr lang="de-DE" dirty="0"/>
+              <a:t>Main Grid</a:t>
+            </a:r>
           </a:p>
         </p:txBody>
       </p:sp>
@@ -4021,7 +4016,7 @@
         </p:nvSpPr>
         <p:spPr>
           <a:xfrm>
-            <a:off x="7062496" y="3209730"/>
+            <a:off x="6563116" y="4040361"/>
             <a:ext cx="1828800" cy="1278293"/>
           </a:xfrm>
           <a:prstGeom prst="rect">
@@ -4116,7 +4111,7 @@
         </p:nvSpPr>
         <p:spPr>
           <a:xfrm>
-            <a:off x="6910096" y="3556932"/>
+            <a:off x="6466151" y="4571609"/>
             <a:ext cx="352338" cy="679508"/>
           </a:xfrm>
           <a:prstGeom prst="rect">
@@ -4211,7 +4206,7 @@
         </p:nvSpPr>
         <p:spPr>
           <a:xfrm>
-            <a:off x="6819215" y="3848876"/>
+            <a:off x="6319835" y="4679507"/>
             <a:ext cx="184558" cy="194618"/>
           </a:xfrm>
           <a:prstGeom prst="flowChartConnector">
@@ -4256,15 +4251,15 @@
             </a:extLst>
           </p:cNvPr>
           <p:cNvCxnSpPr>
-            <a:stCxn id="8" idx="6"/>
+            <a:cxnSpLocks/>
             <a:endCxn id="9" idx="2"/>
           </p:cNvCxnSpPr>
           <p:nvPr/>
         </p:nvCxnSpPr>
         <p:spPr>
           <a:xfrm>
-            <a:off x="4882393" y="3946185"/>
-            <a:ext cx="1936822" cy="0"/>
+            <a:off x="4849833" y="4776816"/>
+            <a:ext cx="1470002" cy="0"/>
           </a:xfrm>
           <a:prstGeom prst="line">
             <a:avLst/>
@@ -4287,10 +4282,10 @@
       </p:cxnSp>
       <p:sp>
         <p:nvSpPr>
-          <p:cNvPr id="13" name="Textfeld 12">
-            <a:extLst>
-              <a:ext uri="{FF2B5EF4-FFF2-40B4-BE49-F238E27FC236}">
-                <a16:creationId xmlns:a16="http://schemas.microsoft.com/office/drawing/2014/main" id="{B58B152F-FE8F-01F7-0785-8FE673A0F3F5}"/>
+          <p:cNvPr id="3" name="Textfeld 2">
+            <a:extLst>
+              <a:ext uri="{FF2B5EF4-FFF2-40B4-BE49-F238E27FC236}">
+                <a16:creationId xmlns:a16="http://schemas.microsoft.com/office/drawing/2014/main" id="{DEDE1406-2AB0-F6E0-1BB9-11B503336D5A}"/>
               </a:ext>
             </a:extLst>
           </p:cNvPr>
@@ -4299,77 +4294,7 @@
         </p:nvSpPr>
         <p:spPr>
           <a:xfrm>
-            <a:off x="4729099" y="3585969"/>
-            <a:ext cx="317716" cy="369332"/>
-          </a:xfrm>
-          <a:prstGeom prst="rect">
-            <a:avLst/>
-          </a:prstGeom>
-          <a:noFill/>
-        </p:spPr>
-        <p:txBody>
-          <a:bodyPr wrap="none" rtlCol="0">
-            <a:spAutoFit/>
-          </a:bodyPr>
-          <a:lstStyle/>
-          <a:p>
-            <a:r>
-              <a:rPr lang="de-DE" dirty="0"/>
-              <a:t>P</a:t>
-            </a:r>
-          </a:p>
-        </p:txBody>
-      </p:sp>
-      <p:sp>
-        <p:nvSpPr>
-          <p:cNvPr id="14" name="Textfeld 13">
-            <a:extLst>
-              <a:ext uri="{FF2B5EF4-FFF2-40B4-BE49-F238E27FC236}">
-                <a16:creationId xmlns:a16="http://schemas.microsoft.com/office/drawing/2014/main" id="{61925D38-4DAB-35A4-B1AA-9F3763575033}"/>
-              </a:ext>
-            </a:extLst>
-          </p:cNvPr>
-          <p:cNvSpPr txBox="1"/>
-          <p:nvPr/>
-        </p:nvSpPr>
-        <p:spPr>
-          <a:xfrm>
-            <a:off x="6618551" y="3623503"/>
-            <a:ext cx="317716" cy="369332"/>
-          </a:xfrm>
-          <a:prstGeom prst="rect">
-            <a:avLst/>
-          </a:prstGeom>
-          <a:noFill/>
-        </p:spPr>
-        <p:txBody>
-          <a:bodyPr wrap="none" rtlCol="0">
-            <a:spAutoFit/>
-          </a:bodyPr>
-          <a:lstStyle/>
-          <a:p>
-            <a:r>
-              <a:rPr lang="de-DE" dirty="0"/>
-              <a:t>P</a:t>
-            </a:r>
-          </a:p>
-        </p:txBody>
-      </p:sp>
-      <p:sp>
-        <p:nvSpPr>
-          <p:cNvPr id="3" name="Textfeld 2">
-            <a:extLst>
-              <a:ext uri="{FF2B5EF4-FFF2-40B4-BE49-F238E27FC236}">
-                <a16:creationId xmlns:a16="http://schemas.microsoft.com/office/drawing/2014/main" id="{DEDE1406-2AB0-F6E0-1BB9-11B503336D5A}"/>
-              </a:ext>
-            </a:extLst>
-          </p:cNvPr>
-          <p:cNvSpPr txBox="1"/>
-          <p:nvPr/>
-        </p:nvSpPr>
-        <p:spPr>
-          <a:xfrm>
-            <a:off x="3137483" y="3623503"/>
+            <a:off x="3340722" y="3712020"/>
             <a:ext cx="1110171" cy="369332"/>
           </a:xfrm>
           <a:prstGeom prst="rect">
@@ -4404,8 +4329,8 @@
         </p:nvSpPr>
         <p:spPr>
           <a:xfrm>
-            <a:off x="7317869" y="3296521"/>
-            <a:ext cx="1452220" cy="1200329"/>
+            <a:off x="6915454" y="4660986"/>
+            <a:ext cx="1452220" cy="369332"/>
           </a:xfrm>
           <a:prstGeom prst="rect">
             <a:avLst/>
@@ -4420,29 +4345,7 @@
           <a:p>
             <a:r>
               <a:rPr lang="de-DE" dirty="0"/>
-              <a:t>Main </a:t>
-            </a:r>
-            <a:r>
-              <a:rPr lang="de-DE" dirty="0" err="1"/>
-              <a:t>Grid</a:t>
-            </a:r>
-            <a:endParaRPr lang="de-DE" dirty="0"/>
-          </a:p>
-          <a:p>
-            <a:endParaRPr lang="de-DE" dirty="0"/>
-          </a:p>
-          <a:p>
-            <a:r>
-              <a:rPr lang="de-DE" dirty="0"/>
-              <a:t>Time </a:t>
-            </a:r>
-            <a:r>
-              <a:rPr lang="de-DE" dirty="0" err="1"/>
-              <a:t>seriesf</a:t>
-            </a:r>
-            <a:r>
-              <a:rPr lang="de-DE" dirty="0"/>
-              <a:t>(t)</a:t>
+              <a:t>Main Grid</a:t>
             </a:r>
           </a:p>
         </p:txBody>
@@ -4554,8 +4457,8 @@
         </p:nvSpPr>
         <p:spPr>
           <a:xfrm>
-            <a:off x="2857031" y="5030318"/>
-            <a:ext cx="1277071" cy="923330"/>
+            <a:off x="3250202" y="5253395"/>
+            <a:ext cx="1277071" cy="369332"/>
           </a:xfrm>
           <a:prstGeom prst="rect">
             <a:avLst/>
@@ -4569,19 +4472,8 @@
           <a:lstStyle/>
           <a:p>
             <a:r>
-              <a:rPr lang="de-DE" dirty="0" err="1"/>
-              <a:t>Battery</a:t>
-            </a:r>
-            <a:endParaRPr lang="de-DE" dirty="0"/>
-          </a:p>
-          <a:p>
-            <a:r>
-              <a:rPr lang="de-DE" dirty="0" err="1"/>
-              <a:t>Variable:P</a:t>
-            </a:r>
-            <a:r>
               <a:rPr lang="de-DE" dirty="0"/>
-              <a:t>(f)</a:t>
+              <a:t>BESS</a:t>
             </a:r>
           </a:p>
         </p:txBody>
@@ -4641,6 +4533,55 @@
         <p:spPr>
           <a:xfrm>
             <a:off x="4583731" y="5394674"/>
+            <a:ext cx="184558" cy="194618"/>
+          </a:xfrm>
+          <a:prstGeom prst="flowChartConnector">
+            <a:avLst/>
+          </a:prstGeom>
+          <a:solidFill>
+            <a:schemeClr val="accent6"/>
+          </a:solidFill>
+        </p:spPr>
+        <p:style>
+          <a:lnRef idx="2">
+            <a:schemeClr val="accent1">
+              <a:shade val="15000"/>
+            </a:schemeClr>
+          </a:lnRef>
+          <a:fillRef idx="1">
+            <a:schemeClr val="accent1"/>
+          </a:fillRef>
+          <a:effectRef idx="0">
+            <a:schemeClr val="accent1"/>
+          </a:effectRef>
+          <a:fontRef idx="minor">
+            <a:schemeClr val="lt1"/>
+          </a:fontRef>
+        </p:style>
+        <p:txBody>
+          <a:bodyPr rtlCol="0" anchor="ctr"/>
+          <a:lstStyle/>
+          <a:p>
+            <a:pPr algn="ctr"/>
+            <a:endParaRPr lang="de-DE"/>
+          </a:p>
+        </p:txBody>
+      </p:sp>
+      <p:sp>
+        <p:nvSpPr>
+          <p:cNvPr id="20" name="Flussdiagramm: Verbinder 19">
+            <a:extLst>
+              <a:ext uri="{FF2B5EF4-FFF2-40B4-BE49-F238E27FC236}">
+                <a16:creationId xmlns:a16="http://schemas.microsoft.com/office/drawing/2014/main" id="{811EB4F9-964D-E39E-242D-FB922E710507}"/>
+              </a:ext>
+            </a:extLst>
+          </p:cNvPr>
+          <p:cNvSpPr/>
+          <p:nvPr/>
+        </p:nvSpPr>
+        <p:spPr>
+          <a:xfrm>
+            <a:off x="4763695" y="4692469"/>
             <a:ext cx="184558" cy="194618"/>
           </a:xfrm>
           <a:prstGeom prst="flowChartConnector">
@@ -4707,35 +4648,10 @@
       </p:grpSpPr>
       <p:sp>
         <p:nvSpPr>
-          <p:cNvPr id="2" name="Titel 1">
-            <a:extLst>
-              <a:ext uri="{FF2B5EF4-FFF2-40B4-BE49-F238E27FC236}">
-                <a16:creationId xmlns:a16="http://schemas.microsoft.com/office/drawing/2014/main" id="{91166D35-B3F3-12BC-220F-279799A4A15E}"/>
-              </a:ext>
-            </a:extLst>
-          </p:cNvPr>
-          <p:cNvSpPr>
-            <a:spLocks noGrp="1"/>
-          </p:cNvSpPr>
-          <p:nvPr>
-            <p:ph type="title"/>
-          </p:nvPr>
-        </p:nvSpPr>
-        <p:spPr/>
-        <p:txBody>
-          <a:bodyPr/>
-          <a:lstStyle/>
-          <a:p>
-            <a:endParaRPr lang="de-DE"/>
-          </a:p>
-        </p:txBody>
-      </p:sp>
-      <p:sp>
-        <p:nvSpPr>
-          <p:cNvPr id="4" name="Rechteck 3">
-            <a:extLst>
-              <a:ext uri="{FF2B5EF4-FFF2-40B4-BE49-F238E27FC236}">
-                <a16:creationId xmlns:a16="http://schemas.microsoft.com/office/drawing/2014/main" id="{E23ACDB0-C638-FDC5-5424-0677F74791EE}"/>
+          <p:cNvPr id="23" name="Rechteck 22">
+            <a:extLst>
+              <a:ext uri="{FF2B5EF4-FFF2-40B4-BE49-F238E27FC236}">
+                <a16:creationId xmlns:a16="http://schemas.microsoft.com/office/drawing/2014/main" id="{B7F83201-BEB5-BE6F-7C23-638F16494566}"/>
               </a:ext>
             </a:extLst>
           </p:cNvPr>
@@ -4744,8 +4660,8 @@
         </p:nvSpPr>
         <p:spPr>
           <a:xfrm>
-            <a:off x="2771192" y="3209731"/>
-            <a:ext cx="1828800" cy="1278293"/>
+            <a:off x="5583266" y="2523267"/>
+            <a:ext cx="1828800" cy="543168"/>
           </a:xfrm>
           <a:prstGeom prst="rect">
             <a:avLst/>
@@ -4779,10 +4695,10 @@
       </p:sp>
       <p:sp>
         <p:nvSpPr>
-          <p:cNvPr id="5" name="Rechteck 4">
-            <a:extLst>
-              <a:ext uri="{FF2B5EF4-FFF2-40B4-BE49-F238E27FC236}">
-                <a16:creationId xmlns:a16="http://schemas.microsoft.com/office/drawing/2014/main" id="{B2EC4EF0-730F-E2BF-04AB-53F7D6EA377D}"/>
+          <p:cNvPr id="4" name="Rechteck 3">
+            <a:extLst>
+              <a:ext uri="{FF2B5EF4-FFF2-40B4-BE49-F238E27FC236}">
+                <a16:creationId xmlns:a16="http://schemas.microsoft.com/office/drawing/2014/main" id="{E23ACDB0-C638-FDC5-5424-0677F74791EE}"/>
               </a:ext>
             </a:extLst>
           </p:cNvPr>
@@ -4791,15 +4707,13 @@
         </p:nvSpPr>
         <p:spPr>
           <a:xfrm>
-            <a:off x="7063760" y="3161921"/>
+            <a:off x="5598367" y="3676261"/>
             <a:ext cx="1828800" cy="1278293"/>
           </a:xfrm>
           <a:prstGeom prst="rect">
             <a:avLst/>
           </a:prstGeom>
-          <a:solidFill>
-            <a:schemeClr val="bg1"/>
-          </a:solidFill>
+          <a:noFill/>
         </p:spPr>
         <p:style>
           <a:lnRef idx="2">
@@ -4828,10 +4742,10 @@
       </p:sp>
       <p:sp>
         <p:nvSpPr>
-          <p:cNvPr id="6" name="Rechteck 5">
-            <a:extLst>
-              <a:ext uri="{FF2B5EF4-FFF2-40B4-BE49-F238E27FC236}">
-                <a16:creationId xmlns:a16="http://schemas.microsoft.com/office/drawing/2014/main" id="{BB9CDDEE-5EF3-EB10-B8F1-060017A86251}"/>
+          <p:cNvPr id="5" name="Rechteck 4">
+            <a:extLst>
+              <a:ext uri="{FF2B5EF4-FFF2-40B4-BE49-F238E27FC236}">
+                <a16:creationId xmlns:a16="http://schemas.microsoft.com/office/drawing/2014/main" id="{B2EC4EF0-730F-E2BF-04AB-53F7D6EA377D}"/>
               </a:ext>
             </a:extLst>
           </p:cNvPr>
@@ -4840,12 +4754,15 @@
         </p:nvSpPr>
         <p:spPr>
           <a:xfrm>
-            <a:off x="4437776" y="3556932"/>
-            <a:ext cx="352338" cy="679508"/>
+            <a:off x="9890935" y="3628451"/>
+            <a:ext cx="1828800" cy="1278293"/>
           </a:xfrm>
           <a:prstGeom prst="rect">
             <a:avLst/>
           </a:prstGeom>
+          <a:solidFill>
+            <a:schemeClr val="bg1"/>
+          </a:solidFill>
         </p:spPr>
         <p:style>
           <a:lnRef idx="2">
@@ -4874,10 +4791,10 @@
       </p:sp>
       <p:sp>
         <p:nvSpPr>
-          <p:cNvPr id="7" name="Rechteck 6">
-            <a:extLst>
-              <a:ext uri="{FF2B5EF4-FFF2-40B4-BE49-F238E27FC236}">
-                <a16:creationId xmlns:a16="http://schemas.microsoft.com/office/drawing/2014/main" id="{4696665C-3306-864F-59A1-E079AC923804}"/>
+          <p:cNvPr id="6" name="Rechteck 5">
+            <a:extLst>
+              <a:ext uri="{FF2B5EF4-FFF2-40B4-BE49-F238E27FC236}">
+                <a16:creationId xmlns:a16="http://schemas.microsoft.com/office/drawing/2014/main" id="{BB9CDDEE-5EF3-EB10-B8F1-060017A86251}"/>
               </a:ext>
             </a:extLst>
           </p:cNvPr>
@@ -4886,7 +4803,7 @@
         </p:nvSpPr>
         <p:spPr>
           <a:xfrm>
-            <a:off x="6911360" y="3509123"/>
+            <a:off x="7264951" y="4023462"/>
             <a:ext cx="352338" cy="679508"/>
           </a:xfrm>
           <a:prstGeom prst="rect">
@@ -4920,10 +4837,10 @@
       </p:sp>
       <p:sp>
         <p:nvSpPr>
-          <p:cNvPr id="8" name="Flussdiagramm: Verbinder 7">
-            <a:extLst>
-              <a:ext uri="{FF2B5EF4-FFF2-40B4-BE49-F238E27FC236}">
-                <a16:creationId xmlns:a16="http://schemas.microsoft.com/office/drawing/2014/main" id="{43A13D55-B3B3-CEBC-82F3-0F61FB20E72B}"/>
+          <p:cNvPr id="7" name="Rechteck 6">
+            <a:extLst>
+              <a:ext uri="{FF2B5EF4-FFF2-40B4-BE49-F238E27FC236}">
+                <a16:creationId xmlns:a16="http://schemas.microsoft.com/office/drawing/2014/main" id="{4696665C-3306-864F-59A1-E079AC923804}"/>
               </a:ext>
             </a:extLst>
           </p:cNvPr>
@@ -4932,15 +4849,12 @@
         </p:nvSpPr>
         <p:spPr>
           <a:xfrm>
-            <a:off x="5188363" y="3798217"/>
-            <a:ext cx="184558" cy="194618"/>
-          </a:xfrm>
-          <a:prstGeom prst="flowChartConnector">
-            <a:avLst/>
-          </a:prstGeom>
-          <a:solidFill>
-            <a:schemeClr val="accent6"/>
-          </a:solidFill>
+            <a:off x="9738535" y="3975653"/>
+            <a:ext cx="352338" cy="679508"/>
+          </a:xfrm>
+          <a:prstGeom prst="rect">
+            <a:avLst/>
+          </a:prstGeom>
         </p:spPr>
         <p:style>
           <a:lnRef idx="2">
@@ -4969,10 +4883,10 @@
       </p:sp>
       <p:sp>
         <p:nvSpPr>
-          <p:cNvPr id="9" name="Flussdiagramm: Verbinder 8">
-            <a:extLst>
-              <a:ext uri="{FF2B5EF4-FFF2-40B4-BE49-F238E27FC236}">
-                <a16:creationId xmlns:a16="http://schemas.microsoft.com/office/drawing/2014/main" id="{0D1436C3-6D2D-8F64-8A8D-53E0BC266D86}"/>
+          <p:cNvPr id="8" name="Flussdiagramm: Verbinder 7">
+            <a:extLst>
+              <a:ext uri="{FF2B5EF4-FFF2-40B4-BE49-F238E27FC236}">
+                <a16:creationId xmlns:a16="http://schemas.microsoft.com/office/drawing/2014/main" id="{43A13D55-B3B3-CEBC-82F3-0F61FB20E72B}"/>
               </a:ext>
             </a:extLst>
           </p:cNvPr>
@@ -4981,7 +4895,7 @@
         </p:nvSpPr>
         <p:spPr>
           <a:xfrm>
-            <a:off x="6820479" y="3801067"/>
+            <a:off x="8015538" y="4264747"/>
             <a:ext cx="184558" cy="194618"/>
           </a:xfrm>
           <a:prstGeom prst="flowChartConnector">
@@ -5016,213 +4930,12 @@
           </a:p>
         </p:txBody>
       </p:sp>
-      <p:cxnSp>
-        <p:nvCxnSpPr>
-          <p:cNvPr id="11" name="Gerader Verbinder 10">
-            <a:extLst>
-              <a:ext uri="{FF2B5EF4-FFF2-40B4-BE49-F238E27FC236}">
-                <a16:creationId xmlns:a16="http://schemas.microsoft.com/office/drawing/2014/main" id="{DFE2FF69-0CF8-E009-FC6D-C8E9EFE954B1}"/>
-              </a:ext>
-            </a:extLst>
-          </p:cNvPr>
-          <p:cNvCxnSpPr>
-            <a:stCxn id="8" idx="6"/>
-            <a:endCxn id="9" idx="2"/>
-          </p:cNvCxnSpPr>
-          <p:nvPr/>
-        </p:nvCxnSpPr>
-        <p:spPr>
-          <a:xfrm>
-            <a:off x="5372921" y="3895526"/>
-            <a:ext cx="1447558" cy="2850"/>
-          </a:xfrm>
-          <a:prstGeom prst="line">
-            <a:avLst/>
-          </a:prstGeom>
-        </p:spPr>
-        <p:style>
-          <a:lnRef idx="2">
-            <a:schemeClr val="accent1"/>
-          </a:lnRef>
-          <a:fillRef idx="0">
-            <a:schemeClr val="accent1"/>
-          </a:fillRef>
-          <a:effectRef idx="1">
-            <a:schemeClr val="accent1"/>
-          </a:effectRef>
-          <a:fontRef idx="minor">
-            <a:schemeClr val="tx1"/>
-          </a:fontRef>
-        </p:style>
-      </p:cxnSp>
-      <p:sp>
-        <p:nvSpPr>
-          <p:cNvPr id="13" name="Textfeld 12">
-            <a:extLst>
-              <a:ext uri="{FF2B5EF4-FFF2-40B4-BE49-F238E27FC236}">
-                <a16:creationId xmlns:a16="http://schemas.microsoft.com/office/drawing/2014/main" id="{B58B152F-FE8F-01F7-0785-8FE673A0F3F5}"/>
-              </a:ext>
-            </a:extLst>
-          </p:cNvPr>
-          <p:cNvSpPr txBox="1"/>
-          <p:nvPr/>
-        </p:nvSpPr>
-        <p:spPr>
-          <a:xfrm>
-            <a:off x="4729099" y="3585969"/>
-            <a:ext cx="317716" cy="369332"/>
-          </a:xfrm>
-          <a:prstGeom prst="rect">
-            <a:avLst/>
-          </a:prstGeom>
-          <a:noFill/>
-        </p:spPr>
-        <p:txBody>
-          <a:bodyPr wrap="none" rtlCol="0">
-            <a:spAutoFit/>
-          </a:bodyPr>
-          <a:lstStyle/>
-          <a:p>
-            <a:r>
-              <a:rPr lang="de-DE" dirty="0"/>
-              <a:t>P</a:t>
-            </a:r>
-          </a:p>
-        </p:txBody>
-      </p:sp>
-      <p:sp>
-        <p:nvSpPr>
-          <p:cNvPr id="14" name="Textfeld 13">
-            <a:extLst>
-              <a:ext uri="{FF2B5EF4-FFF2-40B4-BE49-F238E27FC236}">
-                <a16:creationId xmlns:a16="http://schemas.microsoft.com/office/drawing/2014/main" id="{61925D38-4DAB-35A4-B1AA-9F3763575033}"/>
-              </a:ext>
-            </a:extLst>
-          </p:cNvPr>
-          <p:cNvSpPr txBox="1"/>
-          <p:nvPr/>
-        </p:nvSpPr>
-        <p:spPr>
-          <a:xfrm>
-            <a:off x="6619815" y="3575694"/>
-            <a:ext cx="317716" cy="369332"/>
-          </a:xfrm>
-          <a:prstGeom prst="rect">
-            <a:avLst/>
-          </a:prstGeom>
-          <a:noFill/>
-        </p:spPr>
-        <p:txBody>
-          <a:bodyPr wrap="none" rtlCol="0">
-            <a:spAutoFit/>
-          </a:bodyPr>
-          <a:lstStyle/>
-          <a:p>
-            <a:r>
-              <a:rPr lang="de-DE" dirty="0"/>
-              <a:t>P</a:t>
-            </a:r>
-          </a:p>
-        </p:txBody>
-      </p:sp>
-      <p:sp>
-        <p:nvSpPr>
-          <p:cNvPr id="3" name="Textfeld 2">
-            <a:extLst>
-              <a:ext uri="{FF2B5EF4-FFF2-40B4-BE49-F238E27FC236}">
-                <a16:creationId xmlns:a16="http://schemas.microsoft.com/office/drawing/2014/main" id="{DEDE1406-2AB0-F6E0-1BB9-11B503336D5A}"/>
-              </a:ext>
-            </a:extLst>
-          </p:cNvPr>
-          <p:cNvSpPr txBox="1"/>
-          <p:nvPr/>
-        </p:nvSpPr>
-        <p:spPr>
-          <a:xfrm>
-            <a:off x="3137483" y="3623503"/>
-            <a:ext cx="1110171" cy="369332"/>
-          </a:xfrm>
-          <a:prstGeom prst="rect">
-            <a:avLst/>
-          </a:prstGeom>
-          <a:noFill/>
-        </p:spPr>
-        <p:txBody>
-          <a:bodyPr wrap="square" rtlCol="0">
-            <a:spAutoFit/>
-          </a:bodyPr>
-          <a:lstStyle/>
-          <a:p>
-            <a:r>
-              <a:rPr lang="de-DE" dirty="0"/>
-              <a:t>PV</a:t>
-            </a:r>
-          </a:p>
-        </p:txBody>
-      </p:sp>
-      <p:sp>
-        <p:nvSpPr>
-          <p:cNvPr id="10" name="Textfeld 9">
-            <a:extLst>
-              <a:ext uri="{FF2B5EF4-FFF2-40B4-BE49-F238E27FC236}">
-                <a16:creationId xmlns:a16="http://schemas.microsoft.com/office/drawing/2014/main" id="{E4420A05-FDEE-E86E-3B7E-4118E2CF0E83}"/>
-              </a:ext>
-            </a:extLst>
-          </p:cNvPr>
-          <p:cNvSpPr txBox="1"/>
-          <p:nvPr/>
-        </p:nvSpPr>
-        <p:spPr>
-          <a:xfrm>
-            <a:off x="7319133" y="3248712"/>
-            <a:ext cx="1452220" cy="1200329"/>
-          </a:xfrm>
-          <a:prstGeom prst="rect">
-            <a:avLst/>
-          </a:prstGeom>
-          <a:noFill/>
-        </p:spPr>
-        <p:txBody>
-          <a:bodyPr wrap="square" rtlCol="0">
-            <a:spAutoFit/>
-          </a:bodyPr>
-          <a:lstStyle/>
-          <a:p>
-            <a:r>
-              <a:rPr lang="de-DE" dirty="0"/>
-              <a:t>Main </a:t>
-            </a:r>
-            <a:r>
-              <a:rPr lang="de-DE" dirty="0" err="1"/>
-              <a:t>Grid</a:t>
-            </a:r>
-            <a:endParaRPr lang="de-DE" dirty="0"/>
-          </a:p>
-          <a:p>
-            <a:endParaRPr lang="de-DE" dirty="0"/>
-          </a:p>
-          <a:p>
-            <a:r>
-              <a:rPr lang="de-DE" dirty="0"/>
-              <a:t>Time </a:t>
-            </a:r>
-            <a:r>
-              <a:rPr lang="de-DE" dirty="0" err="1"/>
-              <a:t>seriesf</a:t>
-            </a:r>
-            <a:r>
-              <a:rPr lang="de-DE" dirty="0"/>
-              <a:t>(t)</a:t>
-            </a:r>
-          </a:p>
-        </p:txBody>
-      </p:sp>
-      <p:sp>
-        <p:nvSpPr>
-          <p:cNvPr id="12" name="Rechteck 11">
-            <a:extLst>
-              <a:ext uri="{FF2B5EF4-FFF2-40B4-BE49-F238E27FC236}">
-                <a16:creationId xmlns:a16="http://schemas.microsoft.com/office/drawing/2014/main" id="{4EBF8EBD-2E1B-D4A0-E237-3B9E3295D9CC}"/>
+      <p:sp>
+        <p:nvSpPr>
+          <p:cNvPr id="9" name="Flussdiagramm: Verbinder 8">
+            <a:extLst>
+              <a:ext uri="{FF2B5EF4-FFF2-40B4-BE49-F238E27FC236}">
+                <a16:creationId xmlns:a16="http://schemas.microsoft.com/office/drawing/2014/main" id="{0D1436C3-6D2D-8F64-8A8D-53E0BC266D86}"/>
               </a:ext>
             </a:extLst>
           </p:cNvPr>
@@ -5231,13 +4944,15 @@
         </p:nvSpPr>
         <p:spPr>
           <a:xfrm>
-            <a:off x="2710177" y="4779968"/>
-            <a:ext cx="1828800" cy="1278293"/>
-          </a:xfrm>
-          <a:prstGeom prst="rect">
-            <a:avLst/>
-          </a:prstGeom>
-          <a:noFill/>
+            <a:off x="9647654" y="4267597"/>
+            <a:ext cx="184558" cy="194618"/>
+          </a:xfrm>
+          <a:prstGeom prst="flowChartConnector">
+            <a:avLst/>
+          </a:prstGeom>
+          <a:solidFill>
+            <a:schemeClr val="accent6"/>
+          </a:solidFill>
         </p:spPr>
         <p:style>
           <a:lnRef idx="2">
@@ -5264,12 +4979,191 @@
           </a:p>
         </p:txBody>
       </p:sp>
-      <p:sp>
-        <p:nvSpPr>
-          <p:cNvPr id="15" name="Rechteck 14">
-            <a:extLst>
-              <a:ext uri="{FF2B5EF4-FFF2-40B4-BE49-F238E27FC236}">
-                <a16:creationId xmlns:a16="http://schemas.microsoft.com/office/drawing/2014/main" id="{3562031C-B1A8-B45E-F864-DCF7ED7D46FA}"/>
+      <p:cxnSp>
+        <p:nvCxnSpPr>
+          <p:cNvPr id="11" name="Gerader Verbinder 10">
+            <a:extLst>
+              <a:ext uri="{FF2B5EF4-FFF2-40B4-BE49-F238E27FC236}">
+                <a16:creationId xmlns:a16="http://schemas.microsoft.com/office/drawing/2014/main" id="{DFE2FF69-0CF8-E009-FC6D-C8E9EFE954B1}"/>
+              </a:ext>
+            </a:extLst>
+          </p:cNvPr>
+          <p:cNvCxnSpPr>
+            <a:stCxn id="8" idx="6"/>
+            <a:endCxn id="9" idx="2"/>
+          </p:cNvCxnSpPr>
+          <p:nvPr/>
+        </p:nvCxnSpPr>
+        <p:spPr>
+          <a:xfrm>
+            <a:off x="8200096" y="4362056"/>
+            <a:ext cx="1447558" cy="2850"/>
+          </a:xfrm>
+          <a:prstGeom prst="line">
+            <a:avLst/>
+          </a:prstGeom>
+        </p:spPr>
+        <p:style>
+          <a:lnRef idx="2">
+            <a:schemeClr val="accent1"/>
+          </a:lnRef>
+          <a:fillRef idx="0">
+            <a:schemeClr val="accent1"/>
+          </a:fillRef>
+          <a:effectRef idx="1">
+            <a:schemeClr val="accent1"/>
+          </a:effectRef>
+          <a:fontRef idx="minor">
+            <a:schemeClr val="tx1"/>
+          </a:fontRef>
+        </p:style>
+      </p:cxnSp>
+      <p:sp>
+        <p:nvSpPr>
+          <p:cNvPr id="13" name="Textfeld 12">
+            <a:extLst>
+              <a:ext uri="{FF2B5EF4-FFF2-40B4-BE49-F238E27FC236}">
+                <a16:creationId xmlns:a16="http://schemas.microsoft.com/office/drawing/2014/main" id="{B58B152F-FE8F-01F7-0785-8FE673A0F3F5}"/>
+              </a:ext>
+            </a:extLst>
+          </p:cNvPr>
+          <p:cNvSpPr txBox="1"/>
+          <p:nvPr/>
+        </p:nvSpPr>
+        <p:spPr>
+          <a:xfrm>
+            <a:off x="7556274" y="4052499"/>
+            <a:ext cx="317716" cy="369332"/>
+          </a:xfrm>
+          <a:prstGeom prst="rect">
+            <a:avLst/>
+          </a:prstGeom>
+          <a:noFill/>
+        </p:spPr>
+        <p:txBody>
+          <a:bodyPr wrap="none" rtlCol="0">
+            <a:spAutoFit/>
+          </a:bodyPr>
+          <a:lstStyle/>
+          <a:p>
+            <a:r>
+              <a:rPr lang="de-DE" dirty="0"/>
+              <a:t>P</a:t>
+            </a:r>
+          </a:p>
+        </p:txBody>
+      </p:sp>
+      <p:sp>
+        <p:nvSpPr>
+          <p:cNvPr id="14" name="Textfeld 13">
+            <a:extLst>
+              <a:ext uri="{FF2B5EF4-FFF2-40B4-BE49-F238E27FC236}">
+                <a16:creationId xmlns:a16="http://schemas.microsoft.com/office/drawing/2014/main" id="{61925D38-4DAB-35A4-B1AA-9F3763575033}"/>
+              </a:ext>
+            </a:extLst>
+          </p:cNvPr>
+          <p:cNvSpPr txBox="1"/>
+          <p:nvPr/>
+        </p:nvSpPr>
+        <p:spPr>
+          <a:xfrm>
+            <a:off x="9446990" y="4042224"/>
+            <a:ext cx="317716" cy="369332"/>
+          </a:xfrm>
+          <a:prstGeom prst="rect">
+            <a:avLst/>
+          </a:prstGeom>
+          <a:noFill/>
+        </p:spPr>
+        <p:txBody>
+          <a:bodyPr wrap="none" rtlCol="0">
+            <a:spAutoFit/>
+          </a:bodyPr>
+          <a:lstStyle/>
+          <a:p>
+            <a:r>
+              <a:rPr lang="de-DE" dirty="0"/>
+              <a:t>P</a:t>
+            </a:r>
+          </a:p>
+        </p:txBody>
+      </p:sp>
+      <p:sp>
+        <p:nvSpPr>
+          <p:cNvPr id="3" name="Textfeld 2">
+            <a:extLst>
+              <a:ext uri="{FF2B5EF4-FFF2-40B4-BE49-F238E27FC236}">
+                <a16:creationId xmlns:a16="http://schemas.microsoft.com/office/drawing/2014/main" id="{DEDE1406-2AB0-F6E0-1BB9-11B503336D5A}"/>
+              </a:ext>
+            </a:extLst>
+          </p:cNvPr>
+          <p:cNvSpPr txBox="1"/>
+          <p:nvPr/>
+        </p:nvSpPr>
+        <p:spPr>
+          <a:xfrm>
+            <a:off x="5964658" y="4090033"/>
+            <a:ext cx="1110171" cy="369332"/>
+          </a:xfrm>
+          <a:prstGeom prst="rect">
+            <a:avLst/>
+          </a:prstGeom>
+          <a:noFill/>
+        </p:spPr>
+        <p:txBody>
+          <a:bodyPr wrap="square" rtlCol="0">
+            <a:spAutoFit/>
+          </a:bodyPr>
+          <a:lstStyle/>
+          <a:p>
+            <a:r>
+              <a:rPr lang="de-DE" dirty="0"/>
+              <a:t>PV</a:t>
+            </a:r>
+          </a:p>
+        </p:txBody>
+      </p:sp>
+      <p:sp>
+        <p:nvSpPr>
+          <p:cNvPr id="10" name="Textfeld 9">
+            <a:extLst>
+              <a:ext uri="{FF2B5EF4-FFF2-40B4-BE49-F238E27FC236}">
+                <a16:creationId xmlns:a16="http://schemas.microsoft.com/office/drawing/2014/main" id="{E4420A05-FDEE-E86E-3B7E-4118E2CF0E83}"/>
+              </a:ext>
+            </a:extLst>
+          </p:cNvPr>
+          <p:cNvSpPr txBox="1"/>
+          <p:nvPr/>
+        </p:nvSpPr>
+        <p:spPr>
+          <a:xfrm>
+            <a:off x="10146308" y="3715242"/>
+            <a:ext cx="1452220" cy="369332"/>
+          </a:xfrm>
+          <a:prstGeom prst="rect">
+            <a:avLst/>
+          </a:prstGeom>
+          <a:noFill/>
+        </p:spPr>
+        <p:txBody>
+          <a:bodyPr wrap="square" rtlCol="0">
+            <a:spAutoFit/>
+          </a:bodyPr>
+          <a:lstStyle/>
+          <a:p>
+            <a:r>
+              <a:rPr lang="de-DE" dirty="0"/>
+              <a:t>Main Grid</a:t>
+            </a:r>
+          </a:p>
+        </p:txBody>
+      </p:sp>
+      <p:sp>
+        <p:nvSpPr>
+          <p:cNvPr id="12" name="Rechteck 11">
+            <a:extLst>
+              <a:ext uri="{FF2B5EF4-FFF2-40B4-BE49-F238E27FC236}">
+                <a16:creationId xmlns:a16="http://schemas.microsoft.com/office/drawing/2014/main" id="{4EBF8EBD-2E1B-D4A0-E237-3B9E3295D9CC}"/>
               </a:ext>
             </a:extLst>
           </p:cNvPr>
@@ -5278,12 +5172,13 @@
         </p:nvSpPr>
         <p:spPr>
           <a:xfrm>
-            <a:off x="4376761" y="5127169"/>
-            <a:ext cx="352338" cy="679508"/>
+            <a:off x="5537352" y="5246498"/>
+            <a:ext cx="1828800" cy="1278293"/>
           </a:xfrm>
           <a:prstGeom prst="rect">
             <a:avLst/>
           </a:prstGeom>
+          <a:noFill/>
         </p:spPr>
         <p:style>
           <a:lnRef idx="2">
@@ -5312,94 +5207,10 @@
       </p:sp>
       <p:sp>
         <p:nvSpPr>
-          <p:cNvPr id="16" name="Textfeld 15">
-            <a:extLst>
-              <a:ext uri="{FF2B5EF4-FFF2-40B4-BE49-F238E27FC236}">
-                <a16:creationId xmlns:a16="http://schemas.microsoft.com/office/drawing/2014/main" id="{9BA3A3FC-EE12-E1C7-39E8-729874E5A679}"/>
-              </a:ext>
-            </a:extLst>
-          </p:cNvPr>
-          <p:cNvSpPr txBox="1"/>
-          <p:nvPr/>
-        </p:nvSpPr>
-        <p:spPr>
-          <a:xfrm>
-            <a:off x="2857031" y="5030318"/>
-            <a:ext cx="1277071" cy="923330"/>
-          </a:xfrm>
-          <a:prstGeom prst="rect">
-            <a:avLst/>
-          </a:prstGeom>
-          <a:noFill/>
-        </p:spPr>
-        <p:txBody>
-          <a:bodyPr wrap="square" rtlCol="0">
-            <a:spAutoFit/>
-          </a:bodyPr>
-          <a:lstStyle/>
-          <a:p>
-            <a:r>
-              <a:rPr lang="de-DE" dirty="0" err="1"/>
-              <a:t>Battery</a:t>
-            </a:r>
-            <a:endParaRPr lang="de-DE" dirty="0"/>
-          </a:p>
-          <a:p>
-            <a:r>
-              <a:rPr lang="de-DE" dirty="0" err="1"/>
-              <a:t>Variable:P</a:t>
-            </a:r>
-            <a:r>
-              <a:rPr lang="de-DE" dirty="0"/>
-              <a:t>(f)</a:t>
-            </a:r>
-          </a:p>
-        </p:txBody>
-      </p:sp>
-      <p:cxnSp>
-        <p:nvCxnSpPr>
-          <p:cNvPr id="18" name="Verbinder: gewinkelt 17">
-            <a:extLst>
-              <a:ext uri="{FF2B5EF4-FFF2-40B4-BE49-F238E27FC236}">
-                <a16:creationId xmlns:a16="http://schemas.microsoft.com/office/drawing/2014/main" id="{E553ECD4-D1EF-9E9A-B57A-5F0F0190EBA4}"/>
-              </a:ext>
-            </a:extLst>
-          </p:cNvPr>
-          <p:cNvCxnSpPr>
-            <a:cxnSpLocks/>
-          </p:cNvCxnSpPr>
-          <p:nvPr/>
-        </p:nvCxnSpPr>
-        <p:spPr>
-          <a:xfrm rot="5400000">
-            <a:off x="4255804" y="4430331"/>
-            <a:ext cx="1442814" cy="595765"/>
-          </a:xfrm>
-          <a:prstGeom prst="bentConnector2">
-            <a:avLst/>
-          </a:prstGeom>
-        </p:spPr>
-        <p:style>
-          <a:lnRef idx="2">
-            <a:schemeClr val="accent1"/>
-          </a:lnRef>
-          <a:fillRef idx="0">
-            <a:schemeClr val="accent1"/>
-          </a:fillRef>
-          <a:effectRef idx="1">
-            <a:schemeClr val="accent1"/>
-          </a:effectRef>
-          <a:fontRef idx="minor">
-            <a:schemeClr val="tx1"/>
-          </a:fontRef>
-        </p:style>
-      </p:cxnSp>
-      <p:sp>
-        <p:nvSpPr>
-          <p:cNvPr id="22" name="Flussdiagramm: Verbinder 21">
-            <a:extLst>
-              <a:ext uri="{FF2B5EF4-FFF2-40B4-BE49-F238E27FC236}">
-                <a16:creationId xmlns:a16="http://schemas.microsoft.com/office/drawing/2014/main" id="{4BD4D5C1-A481-B46B-3A3E-9CFF34AE34B6}"/>
+          <p:cNvPr id="15" name="Rechteck 14">
+            <a:extLst>
+              <a:ext uri="{FF2B5EF4-FFF2-40B4-BE49-F238E27FC236}">
+                <a16:creationId xmlns:a16="http://schemas.microsoft.com/office/drawing/2014/main" id="{3562031C-B1A8-B45E-F864-DCF7ED7D46FA}"/>
               </a:ext>
             </a:extLst>
           </p:cNvPr>
@@ -5408,15 +5219,12 @@
         </p:nvSpPr>
         <p:spPr>
           <a:xfrm>
-            <a:off x="4583731" y="5394674"/>
-            <a:ext cx="184558" cy="194618"/>
-          </a:xfrm>
-          <a:prstGeom prst="flowChartConnector">
-            <a:avLst/>
-          </a:prstGeom>
-          <a:solidFill>
-            <a:schemeClr val="accent6"/>
-          </a:solidFill>
+            <a:off x="7203936" y="5593699"/>
+            <a:ext cx="352338" cy="679508"/>
+          </a:xfrm>
+          <a:prstGeom prst="rect">
+            <a:avLst/>
+          </a:prstGeom>
         </p:spPr>
         <p:style>
           <a:lnRef idx="2">
@@ -5445,10 +5253,83 @@
       </p:sp>
       <p:sp>
         <p:nvSpPr>
-          <p:cNvPr id="17" name="Rechteck 16">
-            <a:extLst>
-              <a:ext uri="{FF2B5EF4-FFF2-40B4-BE49-F238E27FC236}">
-                <a16:creationId xmlns:a16="http://schemas.microsoft.com/office/drawing/2014/main" id="{0495C7CF-F716-7801-B0DB-F7FE7FDD2C3C}"/>
+          <p:cNvPr id="16" name="Textfeld 15">
+            <a:extLst>
+              <a:ext uri="{FF2B5EF4-FFF2-40B4-BE49-F238E27FC236}">
+                <a16:creationId xmlns:a16="http://schemas.microsoft.com/office/drawing/2014/main" id="{9BA3A3FC-EE12-E1C7-39E8-729874E5A679}"/>
+              </a:ext>
+            </a:extLst>
+          </p:cNvPr>
+          <p:cNvSpPr txBox="1"/>
+          <p:nvPr/>
+        </p:nvSpPr>
+        <p:spPr>
+          <a:xfrm>
+            <a:off x="5684206" y="5496848"/>
+            <a:ext cx="1277071" cy="369332"/>
+          </a:xfrm>
+          <a:prstGeom prst="rect">
+            <a:avLst/>
+          </a:prstGeom>
+          <a:noFill/>
+        </p:spPr>
+        <p:txBody>
+          <a:bodyPr wrap="square" rtlCol="0">
+            <a:spAutoFit/>
+          </a:bodyPr>
+          <a:lstStyle/>
+          <a:p>
+            <a:r>
+              <a:rPr lang="de-DE" dirty="0"/>
+              <a:t>BESS</a:t>
+            </a:r>
+          </a:p>
+        </p:txBody>
+      </p:sp>
+      <p:cxnSp>
+        <p:nvCxnSpPr>
+          <p:cNvPr id="18" name="Verbinder: gewinkelt 17">
+            <a:extLst>
+              <a:ext uri="{FF2B5EF4-FFF2-40B4-BE49-F238E27FC236}">
+                <a16:creationId xmlns:a16="http://schemas.microsoft.com/office/drawing/2014/main" id="{E553ECD4-D1EF-9E9A-B57A-5F0F0190EBA4}"/>
+              </a:ext>
+            </a:extLst>
+          </p:cNvPr>
+          <p:cNvCxnSpPr>
+            <a:cxnSpLocks/>
+          </p:cNvCxnSpPr>
+          <p:nvPr/>
+        </p:nvCxnSpPr>
+        <p:spPr>
+          <a:xfrm rot="5400000">
+            <a:off x="7082979" y="4896861"/>
+            <a:ext cx="1442814" cy="595765"/>
+          </a:xfrm>
+          <a:prstGeom prst="bentConnector2">
+            <a:avLst/>
+          </a:prstGeom>
+        </p:spPr>
+        <p:style>
+          <a:lnRef idx="2">
+            <a:schemeClr val="accent1"/>
+          </a:lnRef>
+          <a:fillRef idx="0">
+            <a:schemeClr val="accent1"/>
+          </a:fillRef>
+          <a:effectRef idx="1">
+            <a:schemeClr val="accent1"/>
+          </a:effectRef>
+          <a:fontRef idx="minor">
+            <a:schemeClr val="tx1"/>
+          </a:fontRef>
+        </p:style>
+      </p:cxnSp>
+      <p:sp>
+        <p:nvSpPr>
+          <p:cNvPr id="22" name="Flussdiagramm: Verbinder 21">
+            <a:extLst>
+              <a:ext uri="{FF2B5EF4-FFF2-40B4-BE49-F238E27FC236}">
+                <a16:creationId xmlns:a16="http://schemas.microsoft.com/office/drawing/2014/main" id="{4BD4D5C1-A481-B46B-3A3E-9CFF34AE34B6}"/>
               </a:ext>
             </a:extLst>
           </p:cNvPr>
@@ -5457,13 +5338,15 @@
         </p:nvSpPr>
         <p:spPr>
           <a:xfrm>
-            <a:off x="2771192" y="1348957"/>
-            <a:ext cx="1828800" cy="1278293"/>
-          </a:xfrm>
-          <a:prstGeom prst="rect">
-            <a:avLst/>
-          </a:prstGeom>
-          <a:noFill/>
+            <a:off x="7410906" y="5861204"/>
+            <a:ext cx="184558" cy="194618"/>
+          </a:xfrm>
+          <a:prstGeom prst="flowChartConnector">
+            <a:avLst/>
+          </a:prstGeom>
+          <a:solidFill>
+            <a:schemeClr val="accent6"/>
+          </a:solidFill>
         </p:spPr>
         <p:style>
           <a:lnRef idx="2">
@@ -5492,10 +5375,10 @@
       </p:sp>
       <p:sp>
         <p:nvSpPr>
-          <p:cNvPr id="19" name="Rechteck 18">
-            <a:extLst>
-              <a:ext uri="{FF2B5EF4-FFF2-40B4-BE49-F238E27FC236}">
-                <a16:creationId xmlns:a16="http://schemas.microsoft.com/office/drawing/2014/main" id="{2A242BA6-9967-C1A5-DD43-59A24FF7548E}"/>
+          <p:cNvPr id="17" name="Rechteck 16">
+            <a:extLst>
+              <a:ext uri="{FF2B5EF4-FFF2-40B4-BE49-F238E27FC236}">
+                <a16:creationId xmlns:a16="http://schemas.microsoft.com/office/drawing/2014/main" id="{0495C7CF-F716-7801-B0DB-F7FE7FDD2C3C}"/>
               </a:ext>
             </a:extLst>
           </p:cNvPr>
@@ -5504,12 +5387,13 @@
         </p:nvSpPr>
         <p:spPr>
           <a:xfrm>
-            <a:off x="4437776" y="1696158"/>
-            <a:ext cx="352338" cy="679508"/>
+            <a:off x="5582106" y="1815488"/>
+            <a:ext cx="1828800" cy="543168"/>
           </a:xfrm>
           <a:prstGeom prst="rect">
             <a:avLst/>
           </a:prstGeom>
+          <a:noFill/>
         </p:spPr>
         <p:style>
           <a:lnRef idx="2">
@@ -5538,80 +5422,10 @@
       </p:sp>
       <p:sp>
         <p:nvSpPr>
-          <p:cNvPr id="20" name="Textfeld 19">
-            <a:extLst>
-              <a:ext uri="{FF2B5EF4-FFF2-40B4-BE49-F238E27FC236}">
-                <a16:creationId xmlns:a16="http://schemas.microsoft.com/office/drawing/2014/main" id="{07F25CA5-143A-B56F-1077-4FE65D388F72}"/>
-              </a:ext>
-            </a:extLst>
-          </p:cNvPr>
-          <p:cNvSpPr txBox="1"/>
-          <p:nvPr/>
-        </p:nvSpPr>
-        <p:spPr>
-          <a:xfrm>
-            <a:off x="4870647" y="1567789"/>
-            <a:ext cx="317716" cy="369332"/>
-          </a:xfrm>
-          <a:prstGeom prst="rect">
-            <a:avLst/>
-          </a:prstGeom>
-          <a:noFill/>
-        </p:spPr>
-        <p:txBody>
-          <a:bodyPr wrap="none" rtlCol="0">
-            <a:spAutoFit/>
-          </a:bodyPr>
-          <a:lstStyle/>
-          <a:p>
-            <a:r>
-              <a:rPr lang="de-DE" dirty="0"/>
-              <a:t>P</a:t>
-            </a:r>
-          </a:p>
-        </p:txBody>
-      </p:sp>
-      <p:sp>
-        <p:nvSpPr>
-          <p:cNvPr id="21" name="Textfeld 20">
-            <a:extLst>
-              <a:ext uri="{FF2B5EF4-FFF2-40B4-BE49-F238E27FC236}">
-                <a16:creationId xmlns:a16="http://schemas.microsoft.com/office/drawing/2014/main" id="{DF229632-D950-CB92-2F10-8A0E66FCC573}"/>
-              </a:ext>
-            </a:extLst>
-          </p:cNvPr>
-          <p:cNvSpPr txBox="1"/>
-          <p:nvPr/>
-        </p:nvSpPr>
-        <p:spPr>
-          <a:xfrm>
-            <a:off x="3137483" y="1762729"/>
-            <a:ext cx="1110171" cy="369332"/>
-          </a:xfrm>
-          <a:prstGeom prst="rect">
-            <a:avLst/>
-          </a:prstGeom>
-          <a:noFill/>
-        </p:spPr>
-        <p:txBody>
-          <a:bodyPr wrap="square" rtlCol="0">
-            <a:spAutoFit/>
-          </a:bodyPr>
-          <a:lstStyle/>
-          <a:p>
-            <a:r>
-              <a:rPr lang="de-DE" dirty="0"/>
-              <a:t>Load</a:t>
-            </a:r>
-          </a:p>
-        </p:txBody>
-      </p:sp>
-      <p:sp>
-        <p:nvSpPr>
-          <p:cNvPr id="31" name="Flussdiagramm: Verbinder 30">
-            <a:extLst>
-              <a:ext uri="{FF2B5EF4-FFF2-40B4-BE49-F238E27FC236}">
-                <a16:creationId xmlns:a16="http://schemas.microsoft.com/office/drawing/2014/main" id="{90FBA058-938A-CCF7-F1C3-D28999E39B64}"/>
+          <p:cNvPr id="19" name="Rechteck 18">
+            <a:extLst>
+              <a:ext uri="{FF2B5EF4-FFF2-40B4-BE49-F238E27FC236}">
+                <a16:creationId xmlns:a16="http://schemas.microsoft.com/office/drawing/2014/main" id="{2A242BA6-9967-C1A5-DD43-59A24FF7548E}"/>
               </a:ext>
             </a:extLst>
           </p:cNvPr>
@@ -5620,15 +5434,12 @@
         </p:nvSpPr>
         <p:spPr>
           <a:xfrm>
-            <a:off x="4734130" y="1794817"/>
-            <a:ext cx="184558" cy="194618"/>
-          </a:xfrm>
-          <a:prstGeom prst="flowChartConnector">
-            <a:avLst/>
-          </a:prstGeom>
-          <a:solidFill>
-            <a:schemeClr val="accent6"/>
-          </a:solidFill>
+            <a:off x="7264951" y="2162688"/>
+            <a:ext cx="352338" cy="679508"/>
+          </a:xfrm>
+          <a:prstGeom prst="rect">
+            <a:avLst/>
+          </a:prstGeom>
         </p:spPr>
         <p:style>
           <a:lnRef idx="2">
@@ -5655,6 +5466,125 @@
           </a:p>
         </p:txBody>
       </p:sp>
+      <p:sp>
+        <p:nvSpPr>
+          <p:cNvPr id="20" name="Textfeld 19">
+            <a:extLst>
+              <a:ext uri="{FF2B5EF4-FFF2-40B4-BE49-F238E27FC236}">
+                <a16:creationId xmlns:a16="http://schemas.microsoft.com/office/drawing/2014/main" id="{07F25CA5-143A-B56F-1077-4FE65D388F72}"/>
+              </a:ext>
+            </a:extLst>
+          </p:cNvPr>
+          <p:cNvSpPr txBox="1"/>
+          <p:nvPr/>
+        </p:nvSpPr>
+        <p:spPr>
+          <a:xfrm>
+            <a:off x="7697822" y="2034319"/>
+            <a:ext cx="317716" cy="369332"/>
+          </a:xfrm>
+          <a:prstGeom prst="rect">
+            <a:avLst/>
+          </a:prstGeom>
+          <a:noFill/>
+        </p:spPr>
+        <p:txBody>
+          <a:bodyPr wrap="none" rtlCol="0">
+            <a:spAutoFit/>
+          </a:bodyPr>
+          <a:lstStyle/>
+          <a:p>
+            <a:r>
+              <a:rPr lang="de-DE" dirty="0"/>
+              <a:t>P</a:t>
+            </a:r>
+          </a:p>
+        </p:txBody>
+      </p:sp>
+      <p:sp>
+        <p:nvSpPr>
+          <p:cNvPr id="21" name="Textfeld 20">
+            <a:extLst>
+              <a:ext uri="{FF2B5EF4-FFF2-40B4-BE49-F238E27FC236}">
+                <a16:creationId xmlns:a16="http://schemas.microsoft.com/office/drawing/2014/main" id="{DF229632-D950-CB92-2F10-8A0E66FCC573}"/>
+              </a:ext>
+            </a:extLst>
+          </p:cNvPr>
+          <p:cNvSpPr txBox="1"/>
+          <p:nvPr/>
+        </p:nvSpPr>
+        <p:spPr>
+          <a:xfrm>
+            <a:off x="5506003" y="1908860"/>
+            <a:ext cx="1427894" cy="369332"/>
+          </a:xfrm>
+          <a:prstGeom prst="rect">
+            <a:avLst/>
+          </a:prstGeom>
+          <a:noFill/>
+        </p:spPr>
+        <p:txBody>
+          <a:bodyPr wrap="square" rtlCol="0">
+            <a:spAutoFit/>
+          </a:bodyPr>
+          <a:lstStyle/>
+          <a:p>
+            <a:r>
+              <a:rPr lang="de-DE" dirty="0"/>
+              <a:t>Pump N°1</a:t>
+            </a:r>
+          </a:p>
+        </p:txBody>
+      </p:sp>
+      <p:sp>
+        <p:nvSpPr>
+          <p:cNvPr id="31" name="Flussdiagramm: Verbinder 30">
+            <a:extLst>
+              <a:ext uri="{FF2B5EF4-FFF2-40B4-BE49-F238E27FC236}">
+                <a16:creationId xmlns:a16="http://schemas.microsoft.com/office/drawing/2014/main" id="{90FBA058-938A-CCF7-F1C3-D28999E39B64}"/>
+              </a:ext>
+            </a:extLst>
+          </p:cNvPr>
+          <p:cNvSpPr/>
+          <p:nvPr/>
+        </p:nvSpPr>
+        <p:spPr>
+          <a:xfrm>
+            <a:off x="7561305" y="2261347"/>
+            <a:ext cx="184558" cy="194618"/>
+          </a:xfrm>
+          <a:prstGeom prst="flowChartConnector">
+            <a:avLst/>
+          </a:prstGeom>
+          <a:solidFill>
+            <a:schemeClr val="accent6"/>
+          </a:solidFill>
+        </p:spPr>
+        <p:style>
+          <a:lnRef idx="2">
+            <a:schemeClr val="accent1">
+              <a:shade val="15000"/>
+            </a:schemeClr>
+          </a:lnRef>
+          <a:fillRef idx="1">
+            <a:schemeClr val="accent1"/>
+          </a:fillRef>
+          <a:effectRef idx="0">
+            <a:schemeClr val="accent1"/>
+          </a:effectRef>
+          <a:fontRef idx="minor">
+            <a:schemeClr val="lt1"/>
+          </a:fontRef>
+        </p:style>
+        <p:txBody>
+          <a:bodyPr rtlCol="0" anchor="ctr"/>
+          <a:lstStyle/>
+          <a:p>
+            <a:pPr algn="ctr"/>
+            <a:endParaRPr lang="de-DE"/>
+          </a:p>
+        </p:txBody>
+      </p:sp>
       <p:cxnSp>
         <p:nvCxnSpPr>
           <p:cNvPr id="37" name="Verbinder: gewinkelt 36">
@@ -5673,7 +5603,7 @@
         </p:nvCxnSpPr>
         <p:spPr>
           <a:xfrm>
-            <a:off x="4918688" y="1892126"/>
+            <a:off x="7745863" y="2358656"/>
             <a:ext cx="361954" cy="1906091"/>
           </a:xfrm>
           <a:prstGeom prst="bentConnector2">
@@ -5712,7 +5642,7 @@
         </p:nvCxnSpPr>
         <p:spPr>
           <a:xfrm flipH="1">
-            <a:off x="4790114" y="3895526"/>
+            <a:off x="7617289" y="4362056"/>
             <a:ext cx="398249" cy="1160"/>
           </a:xfrm>
           <a:prstGeom prst="line">
@@ -5748,7 +5678,7 @@
         </p:nvSpPr>
         <p:spPr>
           <a:xfrm>
-            <a:off x="4685831" y="5143090"/>
+            <a:off x="7513006" y="5609620"/>
             <a:ext cx="317716" cy="369332"/>
           </a:xfrm>
           <a:prstGeom prst="rect">
@@ -5769,6 +5699,759 @@
           </a:p>
         </p:txBody>
       </p:sp>
+      <p:sp>
+        <p:nvSpPr>
+          <p:cNvPr id="24" name="Textfeld 23">
+            <a:extLst>
+              <a:ext uri="{FF2B5EF4-FFF2-40B4-BE49-F238E27FC236}">
+                <a16:creationId xmlns:a16="http://schemas.microsoft.com/office/drawing/2014/main" id="{D710BFA3-043E-EC03-9207-356832AA42BC}"/>
+              </a:ext>
+            </a:extLst>
+          </p:cNvPr>
+          <p:cNvSpPr txBox="1"/>
+          <p:nvPr/>
+        </p:nvSpPr>
+        <p:spPr>
+          <a:xfrm>
+            <a:off x="5519901" y="2613817"/>
+            <a:ext cx="1427894" cy="369332"/>
+          </a:xfrm>
+          <a:prstGeom prst="rect">
+            <a:avLst/>
+          </a:prstGeom>
+          <a:noFill/>
+        </p:spPr>
+        <p:txBody>
+          <a:bodyPr wrap="square" rtlCol="0">
+            <a:spAutoFit/>
+          </a:bodyPr>
+          <a:lstStyle/>
+          <a:p>
+            <a:r>
+              <a:rPr lang="de-DE" dirty="0"/>
+              <a:t>Pump N°2</a:t>
+            </a:r>
+          </a:p>
+        </p:txBody>
+      </p:sp>
+      <p:sp>
+        <p:nvSpPr>
+          <p:cNvPr id="25" name="Rechteck 24">
+            <a:extLst>
+              <a:ext uri="{FF2B5EF4-FFF2-40B4-BE49-F238E27FC236}">
+                <a16:creationId xmlns:a16="http://schemas.microsoft.com/office/drawing/2014/main" id="{EF28BF37-5CAA-C0D8-BB57-ED8F98AA8953}"/>
+              </a:ext>
+            </a:extLst>
+          </p:cNvPr>
+          <p:cNvSpPr/>
+          <p:nvPr/>
+        </p:nvSpPr>
+        <p:spPr>
+          <a:xfrm>
+            <a:off x="5404890" y="1710520"/>
+            <a:ext cx="2108116" cy="1470552"/>
+          </a:xfrm>
+          <a:prstGeom prst="rect">
+            <a:avLst/>
+          </a:prstGeom>
+          <a:noFill/>
+          <a:ln w="6350">
+            <a:prstDash val="dash"/>
+          </a:ln>
+        </p:spPr>
+        <p:style>
+          <a:lnRef idx="2">
+            <a:schemeClr val="accent1">
+              <a:shade val="15000"/>
+            </a:schemeClr>
+          </a:lnRef>
+          <a:fillRef idx="1">
+            <a:schemeClr val="accent1"/>
+          </a:fillRef>
+          <a:effectRef idx="0">
+            <a:schemeClr val="accent1"/>
+          </a:effectRef>
+          <a:fontRef idx="minor">
+            <a:schemeClr val="lt1"/>
+          </a:fontRef>
+        </p:style>
+        <p:txBody>
+          <a:bodyPr rtlCol="0" anchor="ctr"/>
+          <a:lstStyle/>
+          <a:p>
+            <a:pPr algn="ctr"/>
+            <a:endParaRPr lang="de-DE"/>
+          </a:p>
+        </p:txBody>
+      </p:sp>
+      <p:sp>
+        <p:nvSpPr>
+          <p:cNvPr id="26" name="Rechteck 25">
+            <a:extLst>
+              <a:ext uri="{FF2B5EF4-FFF2-40B4-BE49-F238E27FC236}">
+                <a16:creationId xmlns:a16="http://schemas.microsoft.com/office/drawing/2014/main" id="{A2A47ADD-461A-A585-7331-1FF72392E3A1}"/>
+              </a:ext>
+            </a:extLst>
+          </p:cNvPr>
+          <p:cNvSpPr/>
+          <p:nvPr/>
+        </p:nvSpPr>
+        <p:spPr>
+          <a:xfrm>
+            <a:off x="5544548" y="576196"/>
+            <a:ext cx="1828800" cy="543168"/>
+          </a:xfrm>
+          <a:prstGeom prst="rect">
+            <a:avLst/>
+          </a:prstGeom>
+          <a:noFill/>
+        </p:spPr>
+        <p:style>
+          <a:lnRef idx="2">
+            <a:schemeClr val="accent1">
+              <a:shade val="15000"/>
+            </a:schemeClr>
+          </a:lnRef>
+          <a:fillRef idx="1">
+            <a:schemeClr val="accent1"/>
+          </a:fillRef>
+          <a:effectRef idx="0">
+            <a:schemeClr val="accent1"/>
+          </a:effectRef>
+          <a:fontRef idx="minor">
+            <a:schemeClr val="lt1"/>
+          </a:fontRef>
+        </p:style>
+        <p:txBody>
+          <a:bodyPr rtlCol="0" anchor="ctr"/>
+          <a:lstStyle/>
+          <a:p>
+            <a:r>
+              <a:rPr lang="en-US" altLang="en-US" dirty="0">
+                <a:solidFill>
+                  <a:schemeClr val="tx1"/>
+                </a:solidFill>
+              </a:rPr>
+              <a:t>Reservoir R</a:t>
+            </a:r>
+            <a:r>
+              <a:rPr lang="en-US" altLang="en-US" baseline="-25000" dirty="0">
+                <a:solidFill>
+                  <a:schemeClr val="tx1"/>
+                </a:solidFill>
+              </a:rPr>
+              <a:t>0</a:t>
+            </a:r>
+          </a:p>
+        </p:txBody>
+      </p:sp>
+      <p:pic>
+        <p:nvPicPr>
+          <p:cNvPr id="29" name="Grafik 28">
+            <a:extLst>
+              <a:ext uri="{FF2B5EF4-FFF2-40B4-BE49-F238E27FC236}">
+                <a16:creationId xmlns:a16="http://schemas.microsoft.com/office/drawing/2014/main" id="{A032814B-B5BC-607E-0690-BF2676713328}"/>
+              </a:ext>
+            </a:extLst>
+          </p:cNvPr>
+          <p:cNvPicPr>
+            <a:picLocks noChangeAspect="1"/>
+          </p:cNvPicPr>
+          <p:nvPr/>
+        </p:nvPicPr>
+        <p:blipFill>
+          <a:blip r:embed="rId2"/>
+          <a:stretch>
+            <a:fillRect/>
+          </a:stretch>
+        </p:blipFill>
+        <p:spPr>
+          <a:xfrm>
+            <a:off x="6866350" y="680996"/>
+            <a:ext cx="470416" cy="376333"/>
+          </a:xfrm>
+          <a:prstGeom prst="rect">
+            <a:avLst/>
+          </a:prstGeom>
+        </p:spPr>
+      </p:pic>
+      <p:pic>
+        <p:nvPicPr>
+          <p:cNvPr id="32" name="Grafik 31">
+            <a:extLst>
+              <a:ext uri="{FF2B5EF4-FFF2-40B4-BE49-F238E27FC236}">
+                <a16:creationId xmlns:a16="http://schemas.microsoft.com/office/drawing/2014/main" id="{1B1B5743-C6E3-95C8-AB87-39094EF226C8}"/>
+              </a:ext>
+            </a:extLst>
+          </p:cNvPr>
+          <p:cNvPicPr>
+            <a:picLocks noChangeAspect="1"/>
+          </p:cNvPicPr>
+          <p:nvPr/>
+        </p:nvPicPr>
+        <p:blipFill>
+          <a:blip r:embed="rId3"/>
+          <a:stretch>
+            <a:fillRect/>
+          </a:stretch>
+        </p:blipFill>
+        <p:spPr>
+          <a:xfrm>
+            <a:off x="6697073" y="2609006"/>
+            <a:ext cx="470358" cy="385799"/>
+          </a:xfrm>
+          <a:prstGeom prst="rect">
+            <a:avLst/>
+          </a:prstGeom>
+        </p:spPr>
+      </p:pic>
+      <p:pic>
+        <p:nvPicPr>
+          <p:cNvPr id="33" name="Grafik 32">
+            <a:extLst>
+              <a:ext uri="{FF2B5EF4-FFF2-40B4-BE49-F238E27FC236}">
+                <a16:creationId xmlns:a16="http://schemas.microsoft.com/office/drawing/2014/main" id="{20BCCC04-A200-7930-1E10-52D3CDC205AF}"/>
+              </a:ext>
+            </a:extLst>
+          </p:cNvPr>
+          <p:cNvPicPr>
+            <a:picLocks noChangeAspect="1"/>
+          </p:cNvPicPr>
+          <p:nvPr/>
+        </p:nvPicPr>
+        <p:blipFill>
+          <a:blip r:embed="rId3"/>
+          <a:stretch>
+            <a:fillRect/>
+          </a:stretch>
+        </p:blipFill>
+        <p:spPr>
+          <a:xfrm>
+            <a:off x="6690930" y="1862263"/>
+            <a:ext cx="470358" cy="385799"/>
+          </a:xfrm>
+          <a:prstGeom prst="rect">
+            <a:avLst/>
+          </a:prstGeom>
+        </p:spPr>
+      </p:pic>
+      <p:sp>
+        <p:nvSpPr>
+          <p:cNvPr id="34" name="Rechteck 33">
+            <a:extLst>
+              <a:ext uri="{FF2B5EF4-FFF2-40B4-BE49-F238E27FC236}">
+                <a16:creationId xmlns:a16="http://schemas.microsoft.com/office/drawing/2014/main" id="{E4F4E938-25CF-3479-FB2F-360FBBD16BA0}"/>
+              </a:ext>
+            </a:extLst>
+          </p:cNvPr>
+          <p:cNvSpPr/>
+          <p:nvPr/>
+        </p:nvSpPr>
+        <p:spPr>
+          <a:xfrm>
+            <a:off x="1215788" y="2184381"/>
+            <a:ext cx="1828800" cy="543168"/>
+          </a:xfrm>
+          <a:prstGeom prst="rect">
+            <a:avLst/>
+          </a:prstGeom>
+          <a:noFill/>
+        </p:spPr>
+        <p:style>
+          <a:lnRef idx="2">
+            <a:schemeClr val="accent1">
+              <a:shade val="15000"/>
+            </a:schemeClr>
+          </a:lnRef>
+          <a:fillRef idx="1">
+            <a:schemeClr val="accent1"/>
+          </a:fillRef>
+          <a:effectRef idx="0">
+            <a:schemeClr val="accent1"/>
+          </a:effectRef>
+          <a:fontRef idx="minor">
+            <a:schemeClr val="lt1"/>
+          </a:fontRef>
+        </p:style>
+        <p:txBody>
+          <a:bodyPr rtlCol="0" anchor="ctr"/>
+          <a:lstStyle/>
+          <a:p>
+            <a:r>
+              <a:rPr lang="en-US" altLang="en-US" dirty="0">
+                <a:solidFill>
+                  <a:schemeClr val="tx1"/>
+                </a:solidFill>
+              </a:rPr>
+              <a:t>Reservoir R</a:t>
+            </a:r>
+            <a:r>
+              <a:rPr lang="en-US" altLang="en-US" baseline="-25000" dirty="0">
+                <a:solidFill>
+                  <a:schemeClr val="tx1"/>
+                </a:solidFill>
+              </a:rPr>
+              <a:t>1</a:t>
+            </a:r>
+          </a:p>
+        </p:txBody>
+      </p:sp>
+      <p:pic>
+        <p:nvPicPr>
+          <p:cNvPr id="35" name="Grafik 34">
+            <a:extLst>
+              <a:ext uri="{FF2B5EF4-FFF2-40B4-BE49-F238E27FC236}">
+                <a16:creationId xmlns:a16="http://schemas.microsoft.com/office/drawing/2014/main" id="{AF2D9870-3844-7632-6E67-7D62248160E2}"/>
+              </a:ext>
+            </a:extLst>
+          </p:cNvPr>
+          <p:cNvPicPr>
+            <a:picLocks noChangeAspect="1"/>
+          </p:cNvPicPr>
+          <p:nvPr/>
+        </p:nvPicPr>
+        <p:blipFill>
+          <a:blip r:embed="rId2"/>
+          <a:stretch>
+            <a:fillRect/>
+          </a:stretch>
+        </p:blipFill>
+        <p:spPr>
+          <a:xfrm>
+            <a:off x="2473834" y="2283040"/>
+            <a:ext cx="470416" cy="376333"/>
+          </a:xfrm>
+          <a:prstGeom prst="rect">
+            <a:avLst/>
+          </a:prstGeom>
+        </p:spPr>
+      </p:pic>
+      <p:cxnSp>
+        <p:nvCxnSpPr>
+          <p:cNvPr id="38" name="Gerade Verbindung mit Pfeil 37">
+            <a:extLst>
+              <a:ext uri="{FF2B5EF4-FFF2-40B4-BE49-F238E27FC236}">
+                <a16:creationId xmlns:a16="http://schemas.microsoft.com/office/drawing/2014/main" id="{1DB63514-97BE-4B4F-6875-7C46F9871498}"/>
+              </a:ext>
+            </a:extLst>
+          </p:cNvPr>
+          <p:cNvCxnSpPr>
+            <a:cxnSpLocks/>
+            <a:stCxn id="26" idx="2"/>
+            <a:endCxn id="40" idx="0"/>
+          </p:cNvCxnSpPr>
+          <p:nvPr/>
+        </p:nvCxnSpPr>
+        <p:spPr>
+          <a:xfrm>
+            <a:off x="6458948" y="1119364"/>
+            <a:ext cx="0" cy="445859"/>
+          </a:xfrm>
+          <a:prstGeom prst="straightConnector1">
+            <a:avLst/>
+          </a:prstGeom>
+          <a:ln>
+            <a:tailEnd type="triangle"/>
+          </a:ln>
+        </p:spPr>
+        <p:style>
+          <a:lnRef idx="2">
+            <a:schemeClr val="accent1"/>
+          </a:lnRef>
+          <a:fillRef idx="0">
+            <a:schemeClr val="accent1"/>
+          </a:fillRef>
+          <a:effectRef idx="1">
+            <a:schemeClr val="accent1"/>
+          </a:effectRef>
+          <a:fontRef idx="minor">
+            <a:schemeClr val="tx1"/>
+          </a:fontRef>
+        </p:style>
+      </p:cxnSp>
+      <p:sp>
+        <p:nvSpPr>
+          <p:cNvPr id="40" name="Flussdiagramm: Verbinder 39">
+            <a:extLst>
+              <a:ext uri="{FF2B5EF4-FFF2-40B4-BE49-F238E27FC236}">
+                <a16:creationId xmlns:a16="http://schemas.microsoft.com/office/drawing/2014/main" id="{525DCC0A-1F86-EBD1-F195-A9698BBDF74D}"/>
+              </a:ext>
+            </a:extLst>
+          </p:cNvPr>
+          <p:cNvSpPr/>
+          <p:nvPr/>
+        </p:nvSpPr>
+        <p:spPr>
+          <a:xfrm>
+            <a:off x="6366669" y="1565223"/>
+            <a:ext cx="184558" cy="194618"/>
+          </a:xfrm>
+          <a:prstGeom prst="flowChartConnector">
+            <a:avLst/>
+          </a:prstGeom>
+          <a:solidFill>
+            <a:srgbClr val="00B0F0"/>
+          </a:solidFill>
+        </p:spPr>
+        <p:style>
+          <a:lnRef idx="2">
+            <a:schemeClr val="accent1">
+              <a:shade val="15000"/>
+            </a:schemeClr>
+          </a:lnRef>
+          <a:fillRef idx="1">
+            <a:schemeClr val="accent1"/>
+          </a:fillRef>
+          <a:effectRef idx="0">
+            <a:schemeClr val="accent1"/>
+          </a:effectRef>
+          <a:fontRef idx="minor">
+            <a:schemeClr val="lt1"/>
+          </a:fontRef>
+        </p:style>
+        <p:txBody>
+          <a:bodyPr rtlCol="0" anchor="ctr"/>
+          <a:lstStyle/>
+          <a:p>
+            <a:pPr algn="ctr"/>
+            <a:endParaRPr lang="de-DE"/>
+          </a:p>
+        </p:txBody>
+      </p:sp>
+      <p:sp>
+        <p:nvSpPr>
+          <p:cNvPr id="42" name="Rechteck 41">
+            <a:extLst>
+              <a:ext uri="{FF2B5EF4-FFF2-40B4-BE49-F238E27FC236}">
+                <a16:creationId xmlns:a16="http://schemas.microsoft.com/office/drawing/2014/main" id="{ED9E6FAB-F9E2-D2B8-C1BC-BFC609F0E681}"/>
+              </a:ext>
+            </a:extLst>
+          </p:cNvPr>
+          <p:cNvSpPr/>
+          <p:nvPr/>
+        </p:nvSpPr>
+        <p:spPr>
+          <a:xfrm>
+            <a:off x="3681414" y="2123500"/>
+            <a:ext cx="1232541" cy="664930"/>
+          </a:xfrm>
+          <a:prstGeom prst="rect">
+            <a:avLst/>
+          </a:prstGeom>
+          <a:noFill/>
+        </p:spPr>
+        <p:style>
+          <a:lnRef idx="2">
+            <a:schemeClr val="accent1">
+              <a:shade val="15000"/>
+            </a:schemeClr>
+          </a:lnRef>
+          <a:fillRef idx="1">
+            <a:schemeClr val="accent1"/>
+          </a:fillRef>
+          <a:effectRef idx="0">
+            <a:schemeClr val="accent1"/>
+          </a:effectRef>
+          <a:fontRef idx="minor">
+            <a:schemeClr val="lt1"/>
+          </a:fontRef>
+        </p:style>
+        <p:txBody>
+          <a:bodyPr rtlCol="0" anchor="ctr"/>
+          <a:lstStyle/>
+          <a:p>
+            <a:r>
+              <a:rPr lang="en-US" altLang="en-US" dirty="0">
+                <a:solidFill>
+                  <a:schemeClr val="tx1"/>
+                </a:solidFill>
+              </a:rPr>
+              <a:t>Pipe C</a:t>
+            </a:r>
+            <a:r>
+              <a:rPr lang="en-US" altLang="en-US" baseline="-25000" dirty="0">
+                <a:solidFill>
+                  <a:schemeClr val="tx1"/>
+                </a:solidFill>
+              </a:rPr>
+              <a:t>1</a:t>
+            </a:r>
+          </a:p>
+        </p:txBody>
+      </p:sp>
+      <p:pic>
+        <p:nvPicPr>
+          <p:cNvPr id="45" name="Grafik 44">
+            <a:extLst>
+              <a:ext uri="{FF2B5EF4-FFF2-40B4-BE49-F238E27FC236}">
+                <a16:creationId xmlns:a16="http://schemas.microsoft.com/office/drawing/2014/main" id="{F3437EEE-0C51-5AA3-91F9-6AF344048481}"/>
+              </a:ext>
+            </a:extLst>
+          </p:cNvPr>
+          <p:cNvPicPr>
+            <a:picLocks noChangeAspect="1"/>
+          </p:cNvPicPr>
+          <p:nvPr/>
+        </p:nvPicPr>
+        <p:blipFill>
+          <a:blip r:embed="rId4"/>
+          <a:stretch>
+            <a:fillRect/>
+          </a:stretch>
+        </p:blipFill>
+        <p:spPr>
+          <a:xfrm>
+            <a:off x="4467131" y="2261347"/>
+            <a:ext cx="399398" cy="353203"/>
+          </a:xfrm>
+          <a:prstGeom prst="rect">
+            <a:avLst/>
+          </a:prstGeom>
+        </p:spPr>
+      </p:pic>
+      <p:cxnSp>
+        <p:nvCxnSpPr>
+          <p:cNvPr id="46" name="Gerade Verbindung mit Pfeil 45">
+            <a:extLst>
+              <a:ext uri="{FF2B5EF4-FFF2-40B4-BE49-F238E27FC236}">
+                <a16:creationId xmlns:a16="http://schemas.microsoft.com/office/drawing/2014/main" id="{9549806C-9CD0-1A87-A1AF-A002AB9AAACE}"/>
+              </a:ext>
+            </a:extLst>
+          </p:cNvPr>
+          <p:cNvCxnSpPr>
+            <a:cxnSpLocks/>
+            <a:stCxn id="25" idx="1"/>
+            <a:endCxn id="57" idx="6"/>
+          </p:cNvCxnSpPr>
+          <p:nvPr/>
+        </p:nvCxnSpPr>
+        <p:spPr>
+          <a:xfrm flipH="1">
+            <a:off x="5098771" y="2445796"/>
+            <a:ext cx="306119" cy="0"/>
+          </a:xfrm>
+          <a:prstGeom prst="straightConnector1">
+            <a:avLst/>
+          </a:prstGeom>
+          <a:ln>
+            <a:tailEnd type="triangle"/>
+          </a:ln>
+        </p:spPr>
+        <p:style>
+          <a:lnRef idx="2">
+            <a:schemeClr val="accent1"/>
+          </a:lnRef>
+          <a:fillRef idx="0">
+            <a:schemeClr val="accent1"/>
+          </a:fillRef>
+          <a:effectRef idx="1">
+            <a:schemeClr val="accent1"/>
+          </a:effectRef>
+          <a:fontRef idx="minor">
+            <a:schemeClr val="tx1"/>
+          </a:fontRef>
+        </p:style>
+      </p:cxnSp>
+      <p:sp>
+        <p:nvSpPr>
+          <p:cNvPr id="57" name="Flussdiagramm: Verbinder 56">
+            <a:extLst>
+              <a:ext uri="{FF2B5EF4-FFF2-40B4-BE49-F238E27FC236}">
+                <a16:creationId xmlns:a16="http://schemas.microsoft.com/office/drawing/2014/main" id="{5ED71D6D-48B1-18E5-6765-0A319B928E91}"/>
+              </a:ext>
+            </a:extLst>
+          </p:cNvPr>
+          <p:cNvSpPr/>
+          <p:nvPr/>
+        </p:nvSpPr>
+        <p:spPr>
+          <a:xfrm>
+            <a:off x="4914213" y="2348487"/>
+            <a:ext cx="184558" cy="194618"/>
+          </a:xfrm>
+          <a:prstGeom prst="flowChartConnector">
+            <a:avLst/>
+          </a:prstGeom>
+          <a:solidFill>
+            <a:srgbClr val="00B0F0"/>
+          </a:solidFill>
+        </p:spPr>
+        <p:style>
+          <a:lnRef idx="2">
+            <a:schemeClr val="accent1">
+              <a:shade val="15000"/>
+            </a:schemeClr>
+          </a:lnRef>
+          <a:fillRef idx="1">
+            <a:schemeClr val="accent1"/>
+          </a:fillRef>
+          <a:effectRef idx="0">
+            <a:schemeClr val="accent1"/>
+          </a:effectRef>
+          <a:fontRef idx="minor">
+            <a:schemeClr val="lt1"/>
+          </a:fontRef>
+        </p:style>
+        <p:txBody>
+          <a:bodyPr rtlCol="0" anchor="ctr"/>
+          <a:lstStyle/>
+          <a:p>
+            <a:pPr algn="ctr"/>
+            <a:endParaRPr lang="de-DE"/>
+          </a:p>
+        </p:txBody>
+      </p:sp>
+      <p:sp>
+        <p:nvSpPr>
+          <p:cNvPr id="59" name="Flussdiagramm: Verbinder 58">
+            <a:extLst>
+              <a:ext uri="{FF2B5EF4-FFF2-40B4-BE49-F238E27FC236}">
+                <a16:creationId xmlns:a16="http://schemas.microsoft.com/office/drawing/2014/main" id="{44229195-1FF7-BA1B-B995-3D74C2DB909D}"/>
+              </a:ext>
+            </a:extLst>
+          </p:cNvPr>
+          <p:cNvSpPr/>
+          <p:nvPr/>
+        </p:nvSpPr>
+        <p:spPr>
+          <a:xfrm>
+            <a:off x="3051857" y="2358656"/>
+            <a:ext cx="184558" cy="194618"/>
+          </a:xfrm>
+          <a:prstGeom prst="flowChartConnector">
+            <a:avLst/>
+          </a:prstGeom>
+          <a:solidFill>
+            <a:srgbClr val="00B0F0"/>
+          </a:solidFill>
+        </p:spPr>
+        <p:style>
+          <a:lnRef idx="2">
+            <a:schemeClr val="accent1">
+              <a:shade val="15000"/>
+            </a:schemeClr>
+          </a:lnRef>
+          <a:fillRef idx="1">
+            <a:schemeClr val="accent1"/>
+          </a:fillRef>
+          <a:effectRef idx="0">
+            <a:schemeClr val="accent1"/>
+          </a:effectRef>
+          <a:fontRef idx="minor">
+            <a:schemeClr val="lt1"/>
+          </a:fontRef>
+        </p:style>
+        <p:txBody>
+          <a:bodyPr rtlCol="0" anchor="ctr"/>
+          <a:lstStyle/>
+          <a:p>
+            <a:pPr algn="ctr"/>
+            <a:endParaRPr lang="de-DE"/>
+          </a:p>
+        </p:txBody>
+      </p:sp>
+      <p:cxnSp>
+        <p:nvCxnSpPr>
+          <p:cNvPr id="60" name="Gerade Verbindung mit Pfeil 59">
+            <a:extLst>
+              <a:ext uri="{FF2B5EF4-FFF2-40B4-BE49-F238E27FC236}">
+                <a16:creationId xmlns:a16="http://schemas.microsoft.com/office/drawing/2014/main" id="{14B4AA9F-4852-1B26-DCC8-205AE9641485}"/>
+              </a:ext>
+            </a:extLst>
+          </p:cNvPr>
+          <p:cNvCxnSpPr>
+            <a:cxnSpLocks/>
+            <a:stCxn id="42" idx="1"/>
+          </p:cNvCxnSpPr>
+          <p:nvPr/>
+        </p:nvCxnSpPr>
+        <p:spPr>
+          <a:xfrm flipH="1" flipV="1">
+            <a:off x="3236415" y="2453836"/>
+            <a:ext cx="444999" cy="2129"/>
+          </a:xfrm>
+          <a:prstGeom prst="straightConnector1">
+            <a:avLst/>
+          </a:prstGeom>
+          <a:ln>
+            <a:tailEnd type="triangle"/>
+          </a:ln>
+        </p:spPr>
+        <p:style>
+          <a:lnRef idx="2">
+            <a:schemeClr val="accent1"/>
+          </a:lnRef>
+          <a:fillRef idx="0">
+            <a:schemeClr val="accent1"/>
+          </a:fillRef>
+          <a:effectRef idx="1">
+            <a:schemeClr val="accent1"/>
+          </a:effectRef>
+          <a:fontRef idx="minor">
+            <a:schemeClr val="tx1"/>
+          </a:fontRef>
+        </p:style>
+      </p:cxnSp>
+      <p:pic>
+        <p:nvPicPr>
+          <p:cNvPr id="63" name="Grafik 62">
+            <a:extLst>
+              <a:ext uri="{FF2B5EF4-FFF2-40B4-BE49-F238E27FC236}">
+                <a16:creationId xmlns:a16="http://schemas.microsoft.com/office/drawing/2014/main" id="{3643B22C-B1B4-5132-1C4F-C9020F3E4E7E}"/>
+              </a:ext>
+            </a:extLst>
+          </p:cNvPr>
+          <p:cNvPicPr>
+            <a:picLocks noChangeAspect="1"/>
+          </p:cNvPicPr>
+          <p:nvPr/>
+        </p:nvPicPr>
+        <p:blipFill>
+          <a:blip r:embed="rId5"/>
+          <a:stretch>
+            <a:fillRect/>
+          </a:stretch>
+        </p:blipFill>
+        <p:spPr>
+          <a:xfrm flipH="1">
+            <a:off x="11244035" y="4042224"/>
+            <a:ext cx="441946" cy="401865"/>
+          </a:xfrm>
+          <a:prstGeom prst="rect">
+            <a:avLst/>
+          </a:prstGeom>
+        </p:spPr>
+      </p:pic>
+      <p:pic>
+        <p:nvPicPr>
+          <p:cNvPr id="65" name="Grafik 64">
+            <a:extLst>
+              <a:ext uri="{FF2B5EF4-FFF2-40B4-BE49-F238E27FC236}">
+                <a16:creationId xmlns:a16="http://schemas.microsoft.com/office/drawing/2014/main" id="{C6917C13-C426-0CB2-896E-CECE95C0A5F8}"/>
+              </a:ext>
+            </a:extLst>
+          </p:cNvPr>
+          <p:cNvPicPr>
+            <a:picLocks noChangeAspect="1"/>
+          </p:cNvPicPr>
+          <p:nvPr/>
+        </p:nvPicPr>
+        <p:blipFill>
+          <a:blip r:embed="rId6"/>
+          <a:stretch>
+            <a:fillRect/>
+          </a:stretch>
+        </p:blipFill>
+        <p:spPr>
+          <a:xfrm>
+            <a:off x="6353341" y="4259147"/>
+            <a:ext cx="444783" cy="400435"/>
+          </a:xfrm>
+          <a:prstGeom prst="rect">
+            <a:avLst/>
+          </a:prstGeom>
+        </p:spPr>
+      </p:pic>
     </p:spTree>
     <p:extLst>
       <p:ext uri="{BB962C8B-B14F-4D97-AF65-F5344CB8AC3E}">

</xml_diff>